<commit_message>
Just need some more detail now on slides # 3,4,8, & 14
</commit_message>
<xml_diff>
--- a/diffuser_cam_20211202_rev1.pptx
+++ b/diffuser_cam_20211202_rev1.pptx
@@ -7,7 +7,7 @@
     <p:sldMasterId id="2147483660" r:id="rId3"/>
   </p:sldMasterIdLst>
   <p:notesMasterIdLst>
-    <p:notesMasterId r:id="rId30"/>
+    <p:notesMasterId r:id="rId28"/>
   </p:notesMasterIdLst>
   <p:sldIdLst>
     <p:sldId id="256" r:id="rId4"/>
@@ -24,18 +24,16 @@
     <p:sldId id="288" r:id="rId15"/>
     <p:sldId id="289" r:id="rId16"/>
     <p:sldId id="284" r:id="rId17"/>
-    <p:sldId id="287" r:id="rId18"/>
-    <p:sldId id="291" r:id="rId19"/>
+    <p:sldId id="291" r:id="rId18"/>
+    <p:sldId id="302" r:id="rId19"/>
     <p:sldId id="292" r:id="rId20"/>
-    <p:sldId id="293" r:id="rId21"/>
-    <p:sldId id="294" r:id="rId22"/>
+    <p:sldId id="301" r:id="rId21"/>
+    <p:sldId id="303" r:id="rId22"/>
     <p:sldId id="295" r:id="rId23"/>
     <p:sldId id="296" r:id="rId24"/>
     <p:sldId id="297" r:id="rId25"/>
     <p:sldId id="300" r:id="rId26"/>
-    <p:sldId id="269" r:id="rId27"/>
-    <p:sldId id="270" r:id="rId28"/>
-    <p:sldId id="271" r:id="rId29"/>
+    <p:sldId id="304" r:id="rId27"/>
   </p:sldIdLst>
   <p:sldSz cx="12192000" cy="6858000"/>
   <p:notesSz cx="6858000" cy="9144000"/>
@@ -578,6 +576,457 @@
 </p:notes>
 </file>
 
+<file path=ppt/notesSlides/notesSlide10.xml><?xml version="1.0" encoding="utf-8"?>
+<p:notes xmlns:a="http://schemas.openxmlformats.org/drawingml/2006/main" xmlns:r="http://schemas.openxmlformats.org/officeDocument/2006/relationships" xmlns:p="http://schemas.openxmlformats.org/presentationml/2006/main">
+  <p:cSld>
+    <p:spTree>
+      <p:nvGrpSpPr>
+        <p:cNvPr id="1" name=""/>
+        <p:cNvGrpSpPr/>
+        <p:nvPr/>
+      </p:nvGrpSpPr>
+      <p:grpSpPr>
+        <a:xfrm>
+          <a:off x="0" y="0"/>
+          <a:ext cx="0" cy="0"/>
+          <a:chOff x="0" y="0"/>
+          <a:chExt cx="0" cy="0"/>
+        </a:xfrm>
+      </p:grpSpPr>
+      <p:sp>
+        <p:nvSpPr>
+          <p:cNvPr id="2" name="Slide Image Placeholder 1"/>
+          <p:cNvSpPr>
+            <a:spLocks noGrp="1" noRot="1" noChangeAspect="1"/>
+          </p:cNvSpPr>
+          <p:nvPr>
+            <p:ph type="sldImg"/>
+          </p:nvPr>
+        </p:nvSpPr>
+        <p:spPr/>
+      </p:sp>
+      <p:sp>
+        <p:nvSpPr>
+          <p:cNvPr id="3" name="Notes Placeholder 2"/>
+          <p:cNvSpPr>
+            <a:spLocks noGrp="1"/>
+          </p:cNvSpPr>
+          <p:nvPr>
+            <p:ph type="body" idx="1"/>
+          </p:nvPr>
+        </p:nvSpPr>
+        <p:spPr/>
+        <p:txBody>
+          <a:bodyPr/>
+          <a:lstStyle/>
+          <a:p>
+            <a:r>
+              <a:rPr lang="en-US" dirty="0"/>
+              <a:t>See diffuse; Raspberry Pi sensor, aperture, calibration.</a:t>
+            </a:r>
+          </a:p>
+        </p:txBody>
+      </p:sp>
+      <p:sp>
+        <p:nvSpPr>
+          <p:cNvPr id="4" name="Slide Number Placeholder 3"/>
+          <p:cNvSpPr>
+            <a:spLocks noGrp="1"/>
+          </p:cNvSpPr>
+          <p:nvPr>
+            <p:ph type="sldNum" sz="quarter" idx="5"/>
+          </p:nvPr>
+        </p:nvSpPr>
+        <p:spPr/>
+        <p:txBody>
+          <a:bodyPr/>
+          <a:lstStyle/>
+          <a:p>
+            <a:fld id="{2E6E3671-7C21-40CE-930E-1BEAA135AFBB}" type="slidenum">
+              <a:rPr lang="en-US" smtClean="0"/>
+              <a:t>15</a:t>
+            </a:fld>
+            <a:endParaRPr lang="en-US"/>
+          </a:p>
+        </p:txBody>
+      </p:sp>
+    </p:spTree>
+    <p:extLst>
+      <p:ext uri="{BB962C8B-B14F-4D97-AF65-F5344CB8AC3E}">
+        <p14:creationId xmlns:p14="http://schemas.microsoft.com/office/powerpoint/2010/main" val="602056663"/>
+      </p:ext>
+    </p:extLst>
+  </p:cSld>
+  <p:clrMapOvr>
+    <a:masterClrMapping/>
+  </p:clrMapOvr>
+</p:notes>
+</file>
+
+<file path=ppt/notesSlides/notesSlide11.xml><?xml version="1.0" encoding="utf-8"?>
+<p:notes xmlns:a="http://schemas.openxmlformats.org/drawingml/2006/main" xmlns:r="http://schemas.openxmlformats.org/officeDocument/2006/relationships" xmlns:p="http://schemas.openxmlformats.org/presentationml/2006/main">
+  <p:cSld>
+    <p:spTree>
+      <p:nvGrpSpPr>
+        <p:cNvPr id="1" name=""/>
+        <p:cNvGrpSpPr/>
+        <p:nvPr/>
+      </p:nvGrpSpPr>
+      <p:grpSpPr>
+        <a:xfrm>
+          <a:off x="0" y="0"/>
+          <a:ext cx="0" cy="0"/>
+          <a:chOff x="0" y="0"/>
+          <a:chExt cx="0" cy="0"/>
+        </a:xfrm>
+      </p:grpSpPr>
+      <p:sp>
+        <p:nvSpPr>
+          <p:cNvPr id="2" name="Slide Image Placeholder 1"/>
+          <p:cNvSpPr>
+            <a:spLocks noGrp="1" noRot="1" noChangeAspect="1"/>
+          </p:cNvSpPr>
+          <p:nvPr>
+            <p:ph type="sldImg"/>
+          </p:nvPr>
+        </p:nvSpPr>
+        <p:spPr/>
+      </p:sp>
+      <p:sp>
+        <p:nvSpPr>
+          <p:cNvPr id="3" name="Notes Placeholder 2"/>
+          <p:cNvSpPr>
+            <a:spLocks noGrp="1"/>
+          </p:cNvSpPr>
+          <p:nvPr>
+            <p:ph type="body" idx="1"/>
+          </p:nvPr>
+        </p:nvSpPr>
+        <p:spPr/>
+        <p:txBody>
+          <a:bodyPr/>
+          <a:lstStyle/>
+          <a:p>
+            <a:endParaRPr lang="en-US" dirty="0"/>
+          </a:p>
+        </p:txBody>
+      </p:sp>
+      <p:sp>
+        <p:nvSpPr>
+          <p:cNvPr id="4" name="Slide Number Placeholder 3"/>
+          <p:cNvSpPr>
+            <a:spLocks noGrp="1"/>
+          </p:cNvSpPr>
+          <p:nvPr>
+            <p:ph type="sldNum" sz="quarter" idx="5"/>
+          </p:nvPr>
+        </p:nvSpPr>
+        <p:spPr/>
+        <p:txBody>
+          <a:bodyPr/>
+          <a:lstStyle/>
+          <a:p>
+            <a:fld id="{2E6E3671-7C21-40CE-930E-1BEAA135AFBB}" type="slidenum">
+              <a:rPr lang="en-US" smtClean="0"/>
+              <a:t>19</a:t>
+            </a:fld>
+            <a:endParaRPr lang="en-US"/>
+          </a:p>
+        </p:txBody>
+      </p:sp>
+    </p:spTree>
+    <p:extLst>
+      <p:ext uri="{BB962C8B-B14F-4D97-AF65-F5344CB8AC3E}">
+        <p14:creationId xmlns:p14="http://schemas.microsoft.com/office/powerpoint/2010/main" val="3124275974"/>
+      </p:ext>
+    </p:extLst>
+  </p:cSld>
+  <p:clrMapOvr>
+    <a:masterClrMapping/>
+  </p:clrMapOvr>
+</p:notes>
+</file>
+
+<file path=ppt/notesSlides/notesSlide12.xml><?xml version="1.0" encoding="utf-8"?>
+<p:notes xmlns:a="http://schemas.openxmlformats.org/drawingml/2006/main" xmlns:r="http://schemas.openxmlformats.org/officeDocument/2006/relationships" xmlns:p="http://schemas.openxmlformats.org/presentationml/2006/main">
+  <p:cSld>
+    <p:spTree>
+      <p:nvGrpSpPr>
+        <p:cNvPr id="1" name=""/>
+        <p:cNvGrpSpPr/>
+        <p:nvPr/>
+      </p:nvGrpSpPr>
+      <p:grpSpPr>
+        <a:xfrm>
+          <a:off x="0" y="0"/>
+          <a:ext cx="0" cy="0"/>
+          <a:chOff x="0" y="0"/>
+          <a:chExt cx="0" cy="0"/>
+        </a:xfrm>
+      </p:grpSpPr>
+      <p:sp>
+        <p:nvSpPr>
+          <p:cNvPr id="2" name="Slide Image Placeholder 1"/>
+          <p:cNvSpPr>
+            <a:spLocks noGrp="1" noRot="1" noChangeAspect="1"/>
+          </p:cNvSpPr>
+          <p:nvPr>
+            <p:ph type="sldImg"/>
+          </p:nvPr>
+        </p:nvSpPr>
+        <p:spPr/>
+      </p:sp>
+      <p:sp>
+        <p:nvSpPr>
+          <p:cNvPr id="3" name="Notes Placeholder 2"/>
+          <p:cNvSpPr>
+            <a:spLocks noGrp="1"/>
+          </p:cNvSpPr>
+          <p:nvPr>
+            <p:ph type="body" idx="1"/>
+          </p:nvPr>
+        </p:nvSpPr>
+        <p:spPr/>
+        <p:txBody>
+          <a:bodyPr/>
+          <a:lstStyle/>
+          <a:p>
+            <a:r>
+              <a:rPr lang="en-US" dirty="0"/>
+              <a:t>Our voxel size again is our N dimension from earlier determines how fine a resolution we can see that ultimately is related to the complexity of the object and ultimately how much we can process.</a:t>
+            </a:r>
+          </a:p>
+        </p:txBody>
+      </p:sp>
+      <p:sp>
+        <p:nvSpPr>
+          <p:cNvPr id="4" name="Slide Number Placeholder 3"/>
+          <p:cNvSpPr>
+            <a:spLocks noGrp="1"/>
+          </p:cNvSpPr>
+          <p:nvPr>
+            <p:ph type="sldNum" sz="quarter" idx="5"/>
+          </p:nvPr>
+        </p:nvSpPr>
+        <p:spPr/>
+        <p:txBody>
+          <a:bodyPr/>
+          <a:lstStyle/>
+          <a:p>
+            <a:fld id="{2E6E3671-7C21-40CE-930E-1BEAA135AFBB}" type="slidenum">
+              <a:rPr lang="en-US" smtClean="0"/>
+              <a:t>20</a:t>
+            </a:fld>
+            <a:endParaRPr lang="en-US"/>
+          </a:p>
+        </p:txBody>
+      </p:sp>
+    </p:spTree>
+    <p:extLst>
+      <p:ext uri="{BB962C8B-B14F-4D97-AF65-F5344CB8AC3E}">
+        <p14:creationId xmlns:p14="http://schemas.microsoft.com/office/powerpoint/2010/main" val="1670217640"/>
+      </p:ext>
+    </p:extLst>
+  </p:cSld>
+  <p:clrMapOvr>
+    <a:masterClrMapping/>
+  </p:clrMapOvr>
+</p:notes>
+</file>
+
+<file path=ppt/notesSlides/notesSlide13.xml><?xml version="1.0" encoding="utf-8"?>
+<p:notes xmlns:a="http://schemas.openxmlformats.org/drawingml/2006/main" xmlns:r="http://schemas.openxmlformats.org/officeDocument/2006/relationships" xmlns:p="http://schemas.openxmlformats.org/presentationml/2006/main">
+  <p:cSld>
+    <p:spTree>
+      <p:nvGrpSpPr>
+        <p:cNvPr id="1" name=""/>
+        <p:cNvGrpSpPr/>
+        <p:nvPr/>
+      </p:nvGrpSpPr>
+      <p:grpSpPr>
+        <a:xfrm>
+          <a:off x="0" y="0"/>
+          <a:ext cx="0" cy="0"/>
+          <a:chOff x="0" y="0"/>
+          <a:chExt cx="0" cy="0"/>
+        </a:xfrm>
+      </p:grpSpPr>
+      <p:sp>
+        <p:nvSpPr>
+          <p:cNvPr id="2" name="Slide Image Placeholder 1"/>
+          <p:cNvSpPr>
+            <a:spLocks noGrp="1" noRot="1" noChangeAspect="1"/>
+          </p:cNvSpPr>
+          <p:nvPr>
+            <p:ph type="sldImg"/>
+          </p:nvPr>
+        </p:nvSpPr>
+        <p:spPr/>
+      </p:sp>
+      <p:sp>
+        <p:nvSpPr>
+          <p:cNvPr id="3" name="Notes Placeholder 2"/>
+          <p:cNvSpPr>
+            <a:spLocks noGrp="1"/>
+          </p:cNvSpPr>
+          <p:nvPr>
+            <p:ph type="body" idx="1"/>
+          </p:nvPr>
+        </p:nvSpPr>
+        <p:spPr/>
+        <p:txBody>
+          <a:bodyPr/>
+          <a:lstStyle/>
+          <a:p>
+            <a:r>
+              <a:rPr lang="en-US" dirty="0"/>
+              <a:t>However, this project has opened up some interesting lines of research to continue on.</a:t>
+            </a:r>
+          </a:p>
+        </p:txBody>
+      </p:sp>
+      <p:sp>
+        <p:nvSpPr>
+          <p:cNvPr id="4" name="Slide Number Placeholder 3"/>
+          <p:cNvSpPr>
+            <a:spLocks noGrp="1"/>
+          </p:cNvSpPr>
+          <p:nvPr>
+            <p:ph type="sldNum" sz="quarter" idx="5"/>
+          </p:nvPr>
+        </p:nvSpPr>
+        <p:spPr/>
+        <p:txBody>
+          <a:bodyPr/>
+          <a:lstStyle/>
+          <a:p>
+            <a:fld id="{2E6E3671-7C21-40CE-930E-1BEAA135AFBB}" type="slidenum">
+              <a:rPr lang="en-US" smtClean="0"/>
+              <a:t>21</a:t>
+            </a:fld>
+            <a:endParaRPr lang="en-US"/>
+          </a:p>
+        </p:txBody>
+      </p:sp>
+    </p:spTree>
+    <p:extLst>
+      <p:ext uri="{BB962C8B-B14F-4D97-AF65-F5344CB8AC3E}">
+        <p14:creationId xmlns:p14="http://schemas.microsoft.com/office/powerpoint/2010/main" val="1701522176"/>
+      </p:ext>
+    </p:extLst>
+  </p:cSld>
+  <p:clrMapOvr>
+    <a:masterClrMapping/>
+  </p:clrMapOvr>
+</p:notes>
+</file>
+
+<file path=ppt/notesSlides/notesSlide14.xml><?xml version="1.0" encoding="utf-8"?>
+<p:notes xmlns:a="http://schemas.openxmlformats.org/drawingml/2006/main" xmlns:r="http://schemas.openxmlformats.org/officeDocument/2006/relationships" xmlns:p="http://schemas.openxmlformats.org/presentationml/2006/main">
+  <p:cSld>
+    <p:spTree>
+      <p:nvGrpSpPr>
+        <p:cNvPr id="1" name=""/>
+        <p:cNvGrpSpPr/>
+        <p:nvPr/>
+      </p:nvGrpSpPr>
+      <p:grpSpPr>
+        <a:xfrm>
+          <a:off x="0" y="0"/>
+          <a:ext cx="0" cy="0"/>
+          <a:chOff x="0" y="0"/>
+          <a:chExt cx="0" cy="0"/>
+        </a:xfrm>
+      </p:grpSpPr>
+      <p:sp>
+        <p:nvSpPr>
+          <p:cNvPr id="2" name="Slide Image Placeholder 1"/>
+          <p:cNvSpPr>
+            <a:spLocks noGrp="1" noRot="1" noChangeAspect="1"/>
+          </p:cNvSpPr>
+          <p:nvPr>
+            <p:ph type="sldImg"/>
+          </p:nvPr>
+        </p:nvSpPr>
+        <p:spPr/>
+      </p:sp>
+      <p:sp>
+        <p:nvSpPr>
+          <p:cNvPr id="3" name="Notes Placeholder 2"/>
+          <p:cNvSpPr>
+            <a:spLocks noGrp="1"/>
+          </p:cNvSpPr>
+          <p:nvPr>
+            <p:ph type="body" idx="1"/>
+          </p:nvPr>
+        </p:nvSpPr>
+        <p:spPr/>
+        <p:txBody>
+          <a:bodyPr/>
+          <a:lstStyle/>
+          <a:p>
+            <a:r>
+              <a:rPr lang="en-US" dirty="0"/>
+              <a:t>I’ll end my presentation with my coolest slide. </a:t>
+            </a:r>
+            <a:r>
+              <a:rPr lang="en-US" dirty="0">
+                <a:sym typeface="Wingdings" panose="05000000000000000000" pitchFamily="2" charset="2"/>
+              </a:rPr>
+              <a:t> This is the harmonic oscillator model used in quantum mechanics. The wave function which is related to a Hermite </a:t>
+            </a:r>
+            <a:r>
+              <a:rPr lang="en-US" dirty="0" err="1">
+                <a:sym typeface="Wingdings" panose="05000000000000000000" pitchFamily="2" charset="2"/>
+              </a:rPr>
+              <a:t>Polynomial,gaussian</a:t>
+            </a:r>
+            <a:r>
+              <a:rPr lang="en-US" dirty="0">
+                <a:sym typeface="Wingdings" panose="05000000000000000000" pitchFamily="2" charset="2"/>
+              </a:rPr>
+              <a:t> function and a normalization constant. For us, there is a strong connection to modeling the light field as a Wigner distribution.</a:t>
+            </a:r>
+            <a:endParaRPr lang="en-US" dirty="0"/>
+          </a:p>
+        </p:txBody>
+      </p:sp>
+      <p:sp>
+        <p:nvSpPr>
+          <p:cNvPr id="4" name="Slide Number Placeholder 3"/>
+          <p:cNvSpPr>
+            <a:spLocks noGrp="1"/>
+          </p:cNvSpPr>
+          <p:nvPr>
+            <p:ph type="sldNum" sz="quarter" idx="5"/>
+          </p:nvPr>
+        </p:nvSpPr>
+        <p:spPr/>
+        <p:txBody>
+          <a:bodyPr/>
+          <a:lstStyle/>
+          <a:p>
+            <a:fld id="{2E6E3671-7C21-40CE-930E-1BEAA135AFBB}" type="slidenum">
+              <a:rPr lang="en-US" smtClean="0"/>
+              <a:t>23</a:t>
+            </a:fld>
+            <a:endParaRPr lang="en-US"/>
+          </a:p>
+        </p:txBody>
+      </p:sp>
+    </p:spTree>
+    <p:extLst>
+      <p:ext uri="{BB962C8B-B14F-4D97-AF65-F5344CB8AC3E}">
+        <p14:creationId xmlns:p14="http://schemas.microsoft.com/office/powerpoint/2010/main" val="2729683998"/>
+      </p:ext>
+    </p:extLst>
+  </p:cSld>
+  <p:clrMapOvr>
+    <a:masterClrMapping/>
+  </p:clrMapOvr>
+</p:notes>
+</file>
+
 <file path=ppt/notesSlides/notesSlide2.xml><?xml version="1.0" encoding="utf-8"?>
 <p:notes xmlns:a="http://schemas.openxmlformats.org/drawingml/2006/main" xmlns:r="http://schemas.openxmlformats.org/officeDocument/2006/relationships" xmlns:p="http://schemas.openxmlformats.org/presentationml/2006/main">
   <p:cSld>
@@ -624,7 +1073,7 @@
           <a:p>
             <a:r>
               <a:rPr lang="en-US" dirty="0"/>
-              <a:t>Problems with scattering:1.  Light is outside numerical aperture of our system 2. Spatial frequencies of our light are mixed or convolved with our own system and noisy.</a:t>
+              <a:t>Problems with scattering:1.  Light is outside numerical aperture of our system 2. Spatial frequencies of our light are mixed or convolved with our own system and noisy. Since we are all BME’s here or EE’s for the most part then a highly motivating example for us is the field of tissue scattering.</a:t>
             </a:r>
           </a:p>
         </p:txBody>
@@ -1083,6 +1532,101 @@
           <a:p>
             <a:r>
               <a:rPr lang="en-US" dirty="0"/>
+              <a:t>And if you remember from linear systems, a shift is just a re-</a:t>
+            </a:r>
+            <a:r>
+              <a:rPr lang="en-US" dirty="0" err="1"/>
+              <a:t>cyle</a:t>
+            </a:r>
+            <a:r>
+              <a:rPr lang="en-US" dirty="0"/>
+              <a:t> of data in the convolution matrix</a:t>
+            </a:r>
+          </a:p>
+        </p:txBody>
+      </p:sp>
+      <p:sp>
+        <p:nvSpPr>
+          <p:cNvPr id="4" name="Slide Number Placeholder 3"/>
+          <p:cNvSpPr>
+            <a:spLocks noGrp="1"/>
+          </p:cNvSpPr>
+          <p:nvPr>
+            <p:ph type="sldNum" sz="quarter" idx="5"/>
+          </p:nvPr>
+        </p:nvSpPr>
+        <p:spPr/>
+        <p:txBody>
+          <a:bodyPr/>
+          <a:lstStyle/>
+          <a:p>
+            <a:fld id="{2E6E3671-7C21-40CE-930E-1BEAA135AFBB}" type="slidenum">
+              <a:rPr lang="en-US" smtClean="0"/>
+              <a:t>9</a:t>
+            </a:fld>
+            <a:endParaRPr lang="en-US"/>
+          </a:p>
+        </p:txBody>
+      </p:sp>
+    </p:spTree>
+    <p:extLst>
+      <p:ext uri="{BB962C8B-B14F-4D97-AF65-F5344CB8AC3E}">
+        <p14:creationId xmlns:p14="http://schemas.microsoft.com/office/powerpoint/2010/main" val="2210293565"/>
+      </p:ext>
+    </p:extLst>
+  </p:cSld>
+  <p:clrMapOvr>
+    <a:masterClrMapping/>
+  </p:clrMapOvr>
+</p:notes>
+</file>
+
+<file path=ppt/notesSlides/notesSlide8.xml><?xml version="1.0" encoding="utf-8"?>
+<p:notes xmlns:a="http://schemas.openxmlformats.org/drawingml/2006/main" xmlns:r="http://schemas.openxmlformats.org/officeDocument/2006/relationships" xmlns:p="http://schemas.openxmlformats.org/presentationml/2006/main">
+  <p:cSld>
+    <p:spTree>
+      <p:nvGrpSpPr>
+        <p:cNvPr id="1" name=""/>
+        <p:cNvGrpSpPr/>
+        <p:nvPr/>
+      </p:nvGrpSpPr>
+      <p:grpSpPr>
+        <a:xfrm>
+          <a:off x="0" y="0"/>
+          <a:ext cx="0" cy="0"/>
+          <a:chOff x="0" y="0"/>
+          <a:chExt cx="0" cy="0"/>
+        </a:xfrm>
+      </p:grpSpPr>
+      <p:sp>
+        <p:nvSpPr>
+          <p:cNvPr id="2" name="Slide Image Placeholder 1"/>
+          <p:cNvSpPr>
+            <a:spLocks noGrp="1" noRot="1" noChangeAspect="1"/>
+          </p:cNvSpPr>
+          <p:nvPr>
+            <p:ph type="sldImg"/>
+          </p:nvPr>
+        </p:nvSpPr>
+        <p:spPr/>
+      </p:sp>
+      <p:sp>
+        <p:nvSpPr>
+          <p:cNvPr id="3" name="Notes Placeholder 2"/>
+          <p:cNvSpPr>
+            <a:spLocks noGrp="1"/>
+          </p:cNvSpPr>
+          <p:nvPr>
+            <p:ph type="body" idx="1"/>
+          </p:nvPr>
+        </p:nvSpPr>
+        <p:spPr/>
+        <p:txBody>
+          <a:bodyPr/>
+          <a:lstStyle/>
+          <a:p>
+            <a:r>
+              <a:rPr lang="en-US" dirty="0"/>
               <a:t>Here we would like to have something faster to compute for 3-D imaging. We use the FISTA in our experiments. The ADMM is a popular optimization these days. Basically, if you have a way of separating the problem into two convex functions, and you can then make your constraints linearly then there is a big speedup. This method is related to a penalty of </a:t>
             </a:r>
             <a:r>
@@ -1142,7 +1686,7 @@
 </p:notes>
 </file>
 
-<file path=ppt/notesSlides/notesSlide8.xml><?xml version="1.0" encoding="utf-8"?>
+<file path=ppt/notesSlides/notesSlide9.xml><?xml version="1.0" encoding="utf-8"?>
 <p:notes xmlns:a="http://schemas.openxmlformats.org/drawingml/2006/main" xmlns:r="http://schemas.openxmlformats.org/officeDocument/2006/relationships" xmlns:p="http://schemas.openxmlformats.org/presentationml/2006/main">
   <p:cSld>
     <p:spTree>
@@ -11104,14 +11648,59 @@
           <a:p>
             <a:r>
               <a:rPr lang="en-US" dirty="0"/>
-              <a:t>Difficult</a:t>
+              <a:t>Caustics from diffuser</a:t>
             </a:r>
           </a:p>
           <a:p>
             <a:r>
               <a:rPr lang="en-US" dirty="0"/>
-              <a:t> </a:t>
-            </a:r>
+              <a:t> High-frequency in all</a:t>
+            </a:r>
+          </a:p>
+          <a:p>
+            <a:pPr marL="0" indent="0">
+              <a:buNone/>
+            </a:pPr>
+            <a:r>
+              <a:rPr lang="en-US" dirty="0"/>
+              <a:t>    directions</a:t>
+            </a:r>
+          </a:p>
+          <a:p>
+            <a:r>
+              <a:rPr lang="en-US" dirty="0"/>
+              <a:t>This gives us good </a:t>
+            </a:r>
+          </a:p>
+          <a:p>
+            <a:pPr marL="0" indent="0">
+              <a:buNone/>
+            </a:pPr>
+            <a:r>
+              <a:rPr lang="en-US" dirty="0"/>
+              <a:t>   resolution at all depths</a:t>
+            </a:r>
+          </a:p>
+          <a:p>
+            <a:r>
+              <a:rPr lang="en-US" dirty="0"/>
+              <a:t>Highly structured PSF</a:t>
+            </a:r>
+          </a:p>
+          <a:p>
+            <a:pPr marL="0" indent="0">
+              <a:buNone/>
+            </a:pPr>
+            <a:r>
+              <a:rPr lang="en-US" dirty="0"/>
+              <a:t>   for deconvolution</a:t>
+            </a:r>
+          </a:p>
+          <a:p>
+            <a:pPr marL="0" indent="0">
+              <a:buNone/>
+            </a:pPr>
+            <a:endParaRPr lang="en-US" dirty="0"/>
           </a:p>
           <a:p>
             <a:pPr marL="0" indent="0">
@@ -11688,7 +12277,7 @@
           <a:p>
             <a:r>
               <a:rPr lang="en-US" dirty="0"/>
-              <a:t>Difficult </a:t>
+              <a:t>Overall System </a:t>
             </a:r>
           </a:p>
           <a:p>
@@ -11970,7 +12559,39 @@
           <a:p>
             <a:r>
               <a:rPr lang="en-US" dirty="0"/>
-              <a:t>Difficult </a:t>
+              <a:t>Diffuser: Single and Double scotch tape</a:t>
+            </a:r>
+          </a:p>
+          <a:p>
+            <a:r>
+              <a:rPr lang="en-US" dirty="0"/>
+              <a:t>Modified Raspberry Pi Sensor</a:t>
+            </a:r>
+          </a:p>
+          <a:p>
+            <a:r>
+              <a:rPr lang="en-US" dirty="0"/>
+              <a:t>Aperture, housing, enclosure(black tape)</a:t>
+            </a:r>
+          </a:p>
+          <a:p>
+            <a:r>
+              <a:rPr lang="en-US" dirty="0"/>
+              <a:t>Processing off-line with Python &amp; </a:t>
+            </a:r>
+            <a:r>
+              <a:rPr lang="en-US" dirty="0" err="1"/>
+              <a:t>Matlab</a:t>
+            </a:r>
+            <a:endParaRPr lang="en-US" dirty="0"/>
+          </a:p>
+          <a:p>
+            <a:pPr marL="0" indent="0">
+              <a:buNone/>
+            </a:pPr>
+            <a:r>
+              <a:rPr lang="en-US" dirty="0"/>
+              <a:t>(for some pre-processing) </a:t>
             </a:r>
           </a:p>
           <a:p>
@@ -11993,10 +12614,40 @@
           </a:p>
         </p:txBody>
       </p:sp>
+      <p:pic>
+        <p:nvPicPr>
+          <p:cNvPr id="5" name="Picture 4">
+            <a:extLst>
+              <a:ext uri="{FF2B5EF4-FFF2-40B4-BE49-F238E27FC236}">
+                <a16:creationId xmlns:a16="http://schemas.microsoft.com/office/drawing/2014/main" id="{FC463032-6CFC-4961-95E4-E56240481F73}"/>
+              </a:ext>
+            </a:extLst>
+          </p:cNvPr>
+          <p:cNvPicPr>
+            <a:picLocks noChangeAspect="1"/>
+          </p:cNvPicPr>
+          <p:nvPr/>
+        </p:nvPicPr>
+        <p:blipFill>
+          <a:blip r:embed="rId3"/>
+          <a:stretch>
+            <a:fillRect/>
+          </a:stretch>
+        </p:blipFill>
+        <p:spPr>
+          <a:xfrm>
+            <a:off x="7289189" y="2177256"/>
+            <a:ext cx="3152775" cy="3648075"/>
+          </a:xfrm>
+          <a:prstGeom prst="rect">
+            <a:avLst/>
+          </a:prstGeom>
+        </p:spPr>
+      </p:pic>
     </p:spTree>
     <p:extLst>
       <p:ext uri="{BB962C8B-B14F-4D97-AF65-F5344CB8AC3E}">
-        <p14:creationId xmlns:p14="http://schemas.microsoft.com/office/powerpoint/2010/main" val="2603749997"/>
+        <p14:creationId xmlns:p14="http://schemas.microsoft.com/office/powerpoint/2010/main" val="3973601687"/>
       </p:ext>
     </p:extLst>
   </p:cSld>
@@ -12047,7 +12698,7 @@
             <a:pPr algn="ctr"/>
             <a:r>
               <a:rPr lang="en-US" dirty="0"/>
-              <a:t>Setup</a:t>
+              <a:t>Experiments</a:t>
             </a:r>
           </a:p>
         </p:txBody>
@@ -12080,8 +12731,12 @@
           </a:p>
           <a:p>
             <a:r>
+              <a:rPr lang="en-US" dirty="0" err="1"/>
+              <a:t>Antipa</a:t>
+            </a:r>
+            <a:r>
               <a:rPr lang="en-US" dirty="0"/>
-              <a:t>Difficult </a:t>
+              <a:t> PSF and image </a:t>
             </a:r>
           </a:p>
           <a:p>
@@ -12104,10 +12759,40 @@
           </a:p>
         </p:txBody>
       </p:sp>
+      <p:pic>
+        <p:nvPicPr>
+          <p:cNvPr id="5" name="Picture 4">
+            <a:extLst>
+              <a:ext uri="{FF2B5EF4-FFF2-40B4-BE49-F238E27FC236}">
+                <a16:creationId xmlns:a16="http://schemas.microsoft.com/office/drawing/2014/main" id="{9FDF751F-09D1-4F2C-978A-7C4F15946426}"/>
+              </a:ext>
+            </a:extLst>
+          </p:cNvPr>
+          <p:cNvPicPr>
+            <a:picLocks noChangeAspect="1"/>
+          </p:cNvPicPr>
+          <p:nvPr/>
+        </p:nvPicPr>
+        <p:blipFill>
+          <a:blip r:embed="rId2"/>
+          <a:stretch>
+            <a:fillRect/>
+          </a:stretch>
+        </p:blipFill>
+        <p:spPr>
+          <a:xfrm>
+            <a:off x="4688911" y="2644416"/>
+            <a:ext cx="6334125" cy="2257425"/>
+          </a:xfrm>
+          <a:prstGeom prst="rect">
+            <a:avLst/>
+          </a:prstGeom>
+        </p:spPr>
+      </p:pic>
     </p:spTree>
     <p:extLst>
       <p:ext uri="{BB962C8B-B14F-4D97-AF65-F5344CB8AC3E}">
-        <p14:creationId xmlns:p14="http://schemas.microsoft.com/office/powerpoint/2010/main" val="3973601687"/>
+        <p14:creationId xmlns:p14="http://schemas.microsoft.com/office/powerpoint/2010/main" val="2736125052"/>
       </p:ext>
     </p:extLst>
   </p:cSld>
@@ -12179,7 +12864,12 @@
             <p:ph idx="1"/>
           </p:nvPr>
         </p:nvSpPr>
-        <p:spPr/>
+        <p:spPr>
+          <a:xfrm>
+            <a:off x="838200" y="1825625"/>
+            <a:ext cx="10515600" cy="4152388"/>
+          </a:xfrm>
+        </p:spPr>
         <p:txBody>
           <a:bodyPr/>
           <a:lstStyle/>
@@ -12191,8 +12881,12 @@
           </a:p>
           <a:p>
             <a:r>
+              <a:rPr lang="en-US" dirty="0" err="1"/>
+              <a:t>Antipa</a:t>
+            </a:r>
+            <a:r>
               <a:rPr lang="en-US" dirty="0"/>
-              <a:t>Difficult </a:t>
+              <a:t> et al. results </a:t>
             </a:r>
           </a:p>
           <a:p>
@@ -12215,6 +12909,66 @@
           </a:p>
         </p:txBody>
       </p:sp>
+      <p:pic>
+        <p:nvPicPr>
+          <p:cNvPr id="7" name="Picture 6">
+            <a:extLst>
+              <a:ext uri="{FF2B5EF4-FFF2-40B4-BE49-F238E27FC236}">
+                <a16:creationId xmlns:a16="http://schemas.microsoft.com/office/drawing/2014/main" id="{E8F208DC-DD87-42B3-98D7-11D538440B91}"/>
+              </a:ext>
+            </a:extLst>
+          </p:cNvPr>
+          <p:cNvPicPr>
+            <a:picLocks noChangeAspect="1"/>
+          </p:cNvPicPr>
+          <p:nvPr/>
+        </p:nvPicPr>
+        <p:blipFill>
+          <a:blip r:embed="rId2"/>
+          <a:stretch>
+            <a:fillRect/>
+          </a:stretch>
+        </p:blipFill>
+        <p:spPr>
+          <a:xfrm>
+            <a:off x="4292858" y="1898215"/>
+            <a:ext cx="6847092" cy="2121141"/>
+          </a:xfrm>
+          <a:prstGeom prst="rect">
+            <a:avLst/>
+          </a:prstGeom>
+        </p:spPr>
+      </p:pic>
+      <p:pic>
+        <p:nvPicPr>
+          <p:cNvPr id="9" name="Picture 8">
+            <a:extLst>
+              <a:ext uri="{FF2B5EF4-FFF2-40B4-BE49-F238E27FC236}">
+                <a16:creationId xmlns:a16="http://schemas.microsoft.com/office/drawing/2014/main" id="{08ED1328-A6A8-462B-9240-64C963FFFE6A}"/>
+              </a:ext>
+            </a:extLst>
+          </p:cNvPr>
+          <p:cNvPicPr>
+            <a:picLocks noChangeAspect="1"/>
+          </p:cNvPicPr>
+          <p:nvPr/>
+        </p:nvPicPr>
+        <p:blipFill>
+          <a:blip r:embed="rId3"/>
+          <a:stretch>
+            <a:fillRect/>
+          </a:stretch>
+        </p:blipFill>
+        <p:spPr>
+          <a:xfrm>
+            <a:off x="4437883" y="3812879"/>
+            <a:ext cx="7022842" cy="2038118"/>
+          </a:xfrm>
+          <a:prstGeom prst="rect">
+            <a:avLst/>
+          </a:prstGeom>
+        </p:spPr>
+      </p:pic>
     </p:spTree>
     <p:extLst>
       <p:ext uri="{BB962C8B-B14F-4D97-AF65-F5344CB8AC3E}">
@@ -12303,7 +13057,22 @@
           <a:p>
             <a:r>
               <a:rPr lang="en-US" dirty="0"/>
-              <a:t>Difficult </a:t>
+              <a:t>Our results( PSF &amp;</a:t>
+            </a:r>
+          </a:p>
+          <a:p>
+            <a:pPr marL="0" indent="0">
+              <a:buNone/>
+            </a:pPr>
+            <a:r>
+              <a:rPr lang="en-US" dirty="0"/>
+              <a:t>Captured Image</a:t>
+            </a:r>
+          </a:p>
+          <a:p>
+            <a:r>
+              <a:rPr lang="en-US" dirty="0"/>
+              <a:t>Target object </a:t>
             </a:r>
           </a:p>
           <a:p>
@@ -12326,10 +13095,70 @@
           </a:p>
         </p:txBody>
       </p:sp>
+      <p:pic>
+        <p:nvPicPr>
+          <p:cNvPr id="5" name="Picture 4">
+            <a:extLst>
+              <a:ext uri="{FF2B5EF4-FFF2-40B4-BE49-F238E27FC236}">
+                <a16:creationId xmlns:a16="http://schemas.microsoft.com/office/drawing/2014/main" id="{D0F9A941-EDDB-4775-8B8A-3E8E71F78F65}"/>
+              </a:ext>
+            </a:extLst>
+          </p:cNvPr>
+          <p:cNvPicPr>
+            <a:picLocks noChangeAspect="1"/>
+          </p:cNvPicPr>
+          <p:nvPr/>
+        </p:nvPicPr>
+        <p:blipFill>
+          <a:blip r:embed="rId2"/>
+          <a:stretch>
+            <a:fillRect/>
+          </a:stretch>
+        </p:blipFill>
+        <p:spPr>
+          <a:xfrm>
+            <a:off x="4826103" y="1940180"/>
+            <a:ext cx="6254853" cy="2352329"/>
+          </a:xfrm>
+          <a:prstGeom prst="rect">
+            <a:avLst/>
+          </a:prstGeom>
+        </p:spPr>
+      </p:pic>
+      <p:pic>
+        <p:nvPicPr>
+          <p:cNvPr id="7" name="Picture 6">
+            <a:extLst>
+              <a:ext uri="{FF2B5EF4-FFF2-40B4-BE49-F238E27FC236}">
+                <a16:creationId xmlns:a16="http://schemas.microsoft.com/office/drawing/2014/main" id="{14AB9D3B-50DC-4AD8-B853-EC05BA04A5D5}"/>
+              </a:ext>
+            </a:extLst>
+          </p:cNvPr>
+          <p:cNvPicPr>
+            <a:picLocks noChangeAspect="1"/>
+          </p:cNvPicPr>
+          <p:nvPr/>
+        </p:nvPicPr>
+        <p:blipFill>
+          <a:blip r:embed="rId3"/>
+          <a:stretch>
+            <a:fillRect/>
+          </a:stretch>
+        </p:blipFill>
+        <p:spPr>
+          <a:xfrm>
+            <a:off x="6746004" y="4257370"/>
+            <a:ext cx="2751957" cy="1954733"/>
+          </a:xfrm>
+          <a:prstGeom prst="rect">
+            <a:avLst/>
+          </a:prstGeom>
+        </p:spPr>
+      </p:pic>
     </p:spTree>
     <p:extLst>
       <p:ext uri="{BB962C8B-B14F-4D97-AF65-F5344CB8AC3E}">
-        <p14:creationId xmlns:p14="http://schemas.microsoft.com/office/powerpoint/2010/main" val="3272541267"/>
+        <p14:creationId xmlns:p14="http://schemas.microsoft.com/office/powerpoint/2010/main" val="222835474"/>
       </p:ext>
     </p:extLst>
   </p:cSld>
@@ -12380,7 +13209,7 @@
             <a:pPr algn="ctr"/>
             <a:r>
               <a:rPr lang="en-US" dirty="0"/>
-              <a:t>Discussion</a:t>
+              <a:t>Experiments</a:t>
             </a:r>
           </a:p>
         </p:txBody>
@@ -12414,7 +13243,7 @@
           <a:p>
             <a:r>
               <a:rPr lang="en-US" dirty="0"/>
-              <a:t>Difficult </a:t>
+              <a:t>Our results </a:t>
             </a:r>
           </a:p>
           <a:p>
@@ -12437,10 +13266,40 @@
           </a:p>
         </p:txBody>
       </p:sp>
+      <p:pic>
+        <p:nvPicPr>
+          <p:cNvPr id="5" name="Picture 4">
+            <a:extLst>
+              <a:ext uri="{FF2B5EF4-FFF2-40B4-BE49-F238E27FC236}">
+                <a16:creationId xmlns:a16="http://schemas.microsoft.com/office/drawing/2014/main" id="{0C4F0183-6DDA-416F-80C7-F745BEA13433}"/>
+              </a:ext>
+            </a:extLst>
+          </p:cNvPr>
+          <p:cNvPicPr>
+            <a:picLocks noChangeAspect="1"/>
+          </p:cNvPicPr>
+          <p:nvPr/>
+        </p:nvPicPr>
+        <p:blipFill>
+          <a:blip r:embed="rId3"/>
+          <a:stretch>
+            <a:fillRect/>
+          </a:stretch>
+        </p:blipFill>
+        <p:spPr>
+          <a:xfrm>
+            <a:off x="4817654" y="1960562"/>
+            <a:ext cx="5561424" cy="4351338"/>
+          </a:xfrm>
+          <a:prstGeom prst="rect">
+            <a:avLst/>
+          </a:prstGeom>
+        </p:spPr>
+      </p:pic>
     </p:spTree>
     <p:extLst>
       <p:ext uri="{BB962C8B-B14F-4D97-AF65-F5344CB8AC3E}">
-        <p14:creationId xmlns:p14="http://schemas.microsoft.com/office/powerpoint/2010/main" val="1074796616"/>
+        <p14:creationId xmlns:p14="http://schemas.microsoft.com/office/powerpoint/2010/main" val="629093032"/>
       </p:ext>
     </p:extLst>
   </p:cSld>
@@ -12828,7 +13687,31 @@
           <a:p>
             <a:r>
               <a:rPr lang="en-US" dirty="0"/>
-              <a:t>Difficult </a:t>
+              <a:t>Calibration distance problems</a:t>
+            </a:r>
+          </a:p>
+          <a:p>
+            <a:r>
+              <a:rPr lang="en-US" dirty="0"/>
+              <a:t> Modifying sensor</a:t>
+            </a:r>
+          </a:p>
+          <a:p>
+            <a:r>
+              <a:rPr lang="en-US" dirty="0"/>
+              <a:t>Problems with saturation</a:t>
+            </a:r>
+          </a:p>
+          <a:p>
+            <a:r>
+              <a:rPr lang="en-US" dirty="0"/>
+              <a:t>All above contributed to our caustic PSF pattern</a:t>
+            </a:r>
+          </a:p>
+          <a:p>
+            <a:r>
+              <a:rPr lang="en-US" dirty="0"/>
+              <a:t>No able to reproduce with good results</a:t>
             </a:r>
           </a:p>
           <a:p>
@@ -13133,13 +14016,13 @@
           <a:p>
             <a:r>
               <a:rPr lang="en-US" dirty="0">
-                <a:hlinkClick r:id="rId2"/>
+                <a:hlinkClick r:id="rId3"/>
               </a:rPr>
               <a:t>https://commons.wikimedia.org/wiki/File:Wigner_function_of_a_Schr%C3%B6dinger_cat_state.gif#/media/</a:t>
             </a:r>
             <a:r>
               <a:rPr lang="en-US" dirty="0" err="1">
-                <a:hlinkClick r:id="rId2"/>
+                <a:hlinkClick r:id="rId3"/>
               </a:rPr>
               <a:t>File:Wigner_function_of_a_Schrödinger_cat_state.gif</a:t>
             </a:r>
@@ -13165,7 +14048,7 @@
           <p:nvPr/>
         </p:nvPicPr>
         <p:blipFill>
-          <a:blip r:embed="rId3"/>
+          <a:blip r:embed="rId4"/>
           <a:stretch>
             <a:fillRect/>
           </a:stretch>
@@ -13234,7 +14117,7 @@
             <a:pPr algn="ctr"/>
             <a:r>
               <a:rPr lang="en-US" dirty="0"/>
-              <a:t>Status Week of 10/26/21(3)</a:t>
+              <a:t>Partial References</a:t>
             </a:r>
           </a:p>
         </p:txBody>
@@ -13267,12 +14150,273 @@
           </a:p>
           <a:p>
             <a:r>
-              <a:rPr lang="en-US" dirty="0"/>
-              <a:t>Ran algorithm( Gradient descent) with good known images and working aperture </a:t>
-            </a:r>
-          </a:p>
-          <a:p>
-            <a:endParaRPr lang="en-US" dirty="0"/>
+              <a:rPr lang="en-US" sz="1800" dirty="0">
+                <a:effectLst/>
+                <a:latin typeface="TimesNewRoman"/>
+                <a:ea typeface="MS Mincho" panose="02020609040205080304" pitchFamily="49" charset="-128"/>
+                <a:cs typeface="TimesNewRoman"/>
+              </a:rPr>
+              <a:t> N. </a:t>
+            </a:r>
+            <a:r>
+              <a:rPr lang="en-US" sz="1800" dirty="0" err="1">
+                <a:effectLst/>
+                <a:latin typeface="TimesNewRoman"/>
+                <a:ea typeface="MS Mincho" panose="02020609040205080304" pitchFamily="49" charset="-128"/>
+                <a:cs typeface="TimesNewRoman"/>
+              </a:rPr>
+              <a:t>Antipa</a:t>
+            </a:r>
+            <a:r>
+              <a:rPr lang="en-US" sz="1800" dirty="0">
+                <a:effectLst/>
+                <a:latin typeface="TimesNewRoman"/>
+                <a:ea typeface="MS Mincho" panose="02020609040205080304" pitchFamily="49" charset="-128"/>
+                <a:cs typeface="TimesNewRoman"/>
+              </a:rPr>
+              <a:t> et al., “</a:t>
+            </a:r>
+            <a:r>
+              <a:rPr lang="en-US" sz="1800" dirty="0" err="1">
+                <a:effectLst/>
+                <a:latin typeface="TimesNewRoman"/>
+                <a:ea typeface="MS Mincho" panose="02020609040205080304" pitchFamily="49" charset="-128"/>
+                <a:cs typeface="TimesNewRoman"/>
+              </a:rPr>
+              <a:t>DiffuserCam</a:t>
+            </a:r>
+            <a:r>
+              <a:rPr lang="en-US" sz="1800" dirty="0">
+                <a:effectLst/>
+                <a:latin typeface="TimesNewRoman"/>
+                <a:ea typeface="MS Mincho" panose="02020609040205080304" pitchFamily="49" charset="-128"/>
+                <a:cs typeface="TimesNewRoman"/>
+              </a:rPr>
+              <a:t>: </a:t>
+            </a:r>
+            <a:r>
+              <a:rPr lang="en-US" sz="1800" dirty="0" err="1">
+                <a:effectLst/>
+                <a:latin typeface="TimesNewRoman"/>
+                <a:ea typeface="MS Mincho" panose="02020609040205080304" pitchFamily="49" charset="-128"/>
+                <a:cs typeface="TimesNewRoman"/>
+              </a:rPr>
+              <a:t>lensless</a:t>
+            </a:r>
+            <a:r>
+              <a:rPr lang="en-US" sz="1800" dirty="0">
+                <a:effectLst/>
+                <a:latin typeface="TimesNewRoman"/>
+                <a:ea typeface="MS Mincho" panose="02020609040205080304" pitchFamily="49" charset="-128"/>
+                <a:cs typeface="TimesNewRoman"/>
+              </a:rPr>
+              <a:t> single-exposure 3D imaging single-shot,” Optica 5,1-9 (2018).</a:t>
+            </a:r>
+            <a:endParaRPr lang="en-US" sz="1800" dirty="0">
+              <a:effectLst/>
+              <a:latin typeface="Times New Roman" panose="02020603050405020304" pitchFamily="18" charset="0"/>
+              <a:ea typeface="MS Mincho" panose="02020609040205080304" pitchFamily="49" charset="-128"/>
+            </a:endParaRPr>
+          </a:p>
+          <a:p>
+            <a:r>
+              <a:rPr lang="en-US" sz="1800" dirty="0">
+                <a:effectLst/>
+                <a:latin typeface="Times New Roman" panose="02020603050405020304" pitchFamily="18" charset="0"/>
+                <a:ea typeface="MS Mincho" panose="02020609040205080304" pitchFamily="49" charset="-128"/>
+              </a:rPr>
+              <a:t>X. </a:t>
+            </a:r>
+            <a:r>
+              <a:rPr lang="en-US" sz="1800" dirty="0" err="1">
+                <a:effectLst/>
+                <a:latin typeface="Times New Roman" panose="02020603050405020304" pitchFamily="18" charset="0"/>
+                <a:ea typeface="MS Mincho" panose="02020609040205080304" pitchFamily="49" charset="-128"/>
+              </a:rPr>
+              <a:t>Jin</a:t>
+            </a:r>
+            <a:r>
+              <a:rPr lang="en-US" sz="1800" dirty="0">
+                <a:effectLst/>
+                <a:latin typeface="Times New Roman" panose="02020603050405020304" pitchFamily="18" charset="0"/>
+                <a:ea typeface="MS Mincho" panose="02020609040205080304" pitchFamily="49" charset="-128"/>
+              </a:rPr>
+              <a:t>, D. </a:t>
+            </a:r>
+            <a:r>
+              <a:rPr lang="en-US" sz="1800" dirty="0" err="1">
+                <a:effectLst/>
+                <a:latin typeface="Times New Roman" panose="02020603050405020304" pitchFamily="18" charset="0"/>
+                <a:ea typeface="MS Mincho" panose="02020609040205080304" pitchFamily="49" charset="-128"/>
+              </a:rPr>
+              <a:t>Mao,S</a:t>
+            </a:r>
+            <a:r>
+              <a:rPr lang="en-US" sz="1800" dirty="0">
+                <a:effectLst/>
+                <a:latin typeface="Times New Roman" panose="02020603050405020304" pitchFamily="18" charset="0"/>
+                <a:ea typeface="MS Mincho" panose="02020609040205080304" pitchFamily="49" charset="-128"/>
+              </a:rPr>
+              <a:t>. </a:t>
+            </a:r>
+            <a:r>
+              <a:rPr lang="en-US" sz="1800" dirty="0" err="1">
+                <a:effectLst/>
+                <a:latin typeface="Times New Roman" panose="02020603050405020304" pitchFamily="18" charset="0"/>
+                <a:ea typeface="MS Mincho" panose="02020609040205080304" pitchFamily="49" charset="-128"/>
+              </a:rPr>
+              <a:t>Wei,Q</a:t>
+            </a:r>
+            <a:r>
+              <a:rPr lang="en-US" sz="1800" dirty="0">
+                <a:effectLst/>
+                <a:latin typeface="Times New Roman" panose="02020603050405020304" pitchFamily="18" charset="0"/>
+                <a:ea typeface="MS Mincho" panose="02020609040205080304" pitchFamily="49" charset="-128"/>
+              </a:rPr>
+              <a:t>. Dai “Point spread function for diffuser camera based on wave propagation and projection model,” Opt. Express 27, 12748-12761 (2019).</a:t>
+            </a:r>
+          </a:p>
+          <a:p>
+            <a:r>
+              <a:rPr lang="en-US" sz="1800" dirty="0">
+                <a:effectLst/>
+                <a:latin typeface="Times New Roman" panose="02020603050405020304" pitchFamily="18" charset="0"/>
+                <a:ea typeface="MS Mincho" panose="02020609040205080304" pitchFamily="49" charset="-128"/>
+              </a:rPr>
+              <a:t>M. Cai, J. Chen, G. </a:t>
+            </a:r>
+            <a:r>
+              <a:rPr lang="en-US" sz="1800" dirty="0" err="1">
+                <a:effectLst/>
+                <a:latin typeface="Times New Roman" panose="02020603050405020304" pitchFamily="18" charset="0"/>
+                <a:ea typeface="MS Mincho" panose="02020609040205080304" pitchFamily="49" charset="-128"/>
+              </a:rPr>
+              <a:t>Pedrini</a:t>
+            </a:r>
+            <a:r>
+              <a:rPr lang="en-US" sz="1800" dirty="0">
+                <a:effectLst/>
+                <a:latin typeface="Times New Roman" panose="02020603050405020304" pitchFamily="18" charset="0"/>
+                <a:ea typeface="MS Mincho" panose="02020609040205080304" pitchFamily="49" charset="-128"/>
+              </a:rPr>
+              <a:t>, W. </a:t>
+            </a:r>
+            <a:r>
+              <a:rPr lang="en-US" sz="1800" dirty="0" err="1">
+                <a:effectLst/>
+                <a:latin typeface="Times New Roman" panose="02020603050405020304" pitchFamily="18" charset="0"/>
+                <a:ea typeface="MS Mincho" panose="02020609040205080304" pitchFamily="49" charset="-128"/>
+              </a:rPr>
+              <a:t>Osten</a:t>
+            </a:r>
+            <a:r>
+              <a:rPr lang="en-US" sz="1800" dirty="0">
+                <a:effectLst/>
+                <a:latin typeface="Times New Roman" panose="02020603050405020304" pitchFamily="18" charset="0"/>
+                <a:ea typeface="MS Mincho" panose="02020609040205080304" pitchFamily="49" charset="-128"/>
+              </a:rPr>
+              <a:t>, X. Liu, and X. Peng, “</a:t>
+            </a:r>
+            <a:r>
+              <a:rPr lang="en-US" sz="1800" dirty="0" err="1">
+                <a:effectLst/>
+                <a:latin typeface="Times New Roman" panose="02020603050405020304" pitchFamily="18" charset="0"/>
+                <a:ea typeface="MS Mincho" panose="02020609040205080304" pitchFamily="49" charset="-128"/>
+              </a:rPr>
+              <a:t>Lensless</a:t>
+            </a:r>
+            <a:r>
+              <a:rPr lang="en-US" sz="1800" dirty="0">
+                <a:effectLst/>
+                <a:latin typeface="Times New Roman" panose="02020603050405020304" pitchFamily="18" charset="0"/>
+                <a:ea typeface="MS Mincho" panose="02020609040205080304" pitchFamily="49" charset="-128"/>
+              </a:rPr>
+              <a:t> light-field imaging through diffuser </a:t>
+            </a:r>
+            <a:r>
+              <a:rPr lang="en-US" sz="1800" dirty="0" err="1">
+                <a:effectLst/>
+                <a:latin typeface="Times New Roman" panose="02020603050405020304" pitchFamily="18" charset="0"/>
+                <a:ea typeface="MS Mincho" panose="02020609040205080304" pitchFamily="49" charset="-128"/>
+              </a:rPr>
+              <a:t>encoding,”Light</a:t>
+            </a:r>
+            <a:r>
+              <a:rPr lang="en-US" sz="1800" dirty="0">
+                <a:effectLst/>
+                <a:latin typeface="Times New Roman" panose="02020603050405020304" pitchFamily="18" charset="0"/>
+                <a:ea typeface="MS Mincho" panose="02020609040205080304" pitchFamily="49" charset="-128"/>
+              </a:rPr>
+              <a:t> Science &amp; Applications (2020).</a:t>
+            </a:r>
+          </a:p>
+          <a:p>
+            <a:r>
+              <a:rPr lang="en-US" sz="1800" dirty="0">
+                <a:effectLst/>
+                <a:latin typeface="Times New Roman" panose="02020603050405020304" pitchFamily="18" charset="0"/>
+                <a:ea typeface="MS Mincho" panose="02020609040205080304" pitchFamily="49" charset="-128"/>
+              </a:rPr>
+              <a:t>N.C. </a:t>
+            </a:r>
+            <a:r>
+              <a:rPr lang="en-US" sz="1800" dirty="0" err="1">
+                <a:effectLst/>
+                <a:latin typeface="Times New Roman" panose="02020603050405020304" pitchFamily="18" charset="0"/>
+                <a:ea typeface="MS Mincho" panose="02020609040205080304" pitchFamily="49" charset="-128"/>
+              </a:rPr>
+              <a:t>Pegard</a:t>
+            </a:r>
+            <a:r>
+              <a:rPr lang="en-US" sz="1800" dirty="0">
+                <a:effectLst/>
+                <a:latin typeface="Times New Roman" panose="02020603050405020304" pitchFamily="18" charset="0"/>
+                <a:ea typeface="MS Mincho" panose="02020609040205080304" pitchFamily="49" charset="-128"/>
+              </a:rPr>
+              <a:t> et al., “Compressive light-field microscopy for 3D neural activity recording,” Optica 3, 517-524 (2016).</a:t>
+            </a:r>
+          </a:p>
+          <a:p>
+            <a:r>
+              <a:rPr lang="en-US" sz="1800" dirty="0">
+                <a:effectLst/>
+                <a:latin typeface="Times New Roman" panose="02020603050405020304" pitchFamily="18" charset="0"/>
+                <a:ea typeface="MS Mincho" panose="02020609040205080304" pitchFamily="49" charset="-128"/>
+              </a:rPr>
+              <a:t>Z. Zhang, M. </a:t>
+            </a:r>
+            <a:r>
+              <a:rPr lang="en-US" sz="1800" dirty="0" err="1">
+                <a:effectLst/>
+                <a:latin typeface="Times New Roman" panose="02020603050405020304" pitchFamily="18" charset="0"/>
+                <a:ea typeface="MS Mincho" panose="02020609040205080304" pitchFamily="49" charset="-128"/>
+              </a:rPr>
+              <a:t>Levoy</a:t>
+            </a:r>
+            <a:r>
+              <a:rPr lang="en-US" sz="1800" dirty="0">
+                <a:effectLst/>
+                <a:latin typeface="Times New Roman" panose="02020603050405020304" pitchFamily="18" charset="0"/>
+                <a:ea typeface="MS Mincho" panose="02020609040205080304" pitchFamily="49" charset="-128"/>
+              </a:rPr>
+              <a:t>, “ Wigner Distributions and how they relate to the light </a:t>
+            </a:r>
+            <a:r>
+              <a:rPr lang="en-US" sz="1800" dirty="0" err="1">
+                <a:effectLst/>
+                <a:latin typeface="Times New Roman" panose="02020603050405020304" pitchFamily="18" charset="0"/>
+                <a:ea typeface="MS Mincho" panose="02020609040205080304" pitchFamily="49" charset="-128"/>
+              </a:rPr>
+              <a:t>field,”Proceedings</a:t>
+            </a:r>
+            <a:r>
+              <a:rPr lang="en-US" sz="1800" dirty="0">
+                <a:effectLst/>
+                <a:latin typeface="Times New Roman" panose="02020603050405020304" pitchFamily="18" charset="0"/>
+                <a:ea typeface="MS Mincho" panose="02020609040205080304" pitchFamily="49" charset="-128"/>
+              </a:rPr>
+              <a:t> of IEEE ICCP (2009).</a:t>
+            </a:r>
           </a:p>
           <a:p>
             <a:endParaRPr lang="en-US" dirty="0"/>
@@ -13297,448 +14441,10 @@
           </a:p>
         </p:txBody>
       </p:sp>
-      <p:pic>
-        <p:nvPicPr>
-          <p:cNvPr id="6" name="Picture 5">
-            <a:extLst>
-              <a:ext uri="{FF2B5EF4-FFF2-40B4-BE49-F238E27FC236}">
-                <a16:creationId xmlns:a16="http://schemas.microsoft.com/office/drawing/2014/main" id="{DE01E688-6551-4BBF-92E0-ED297601B5A4}"/>
-              </a:ext>
-            </a:extLst>
-          </p:cNvPr>
-          <p:cNvPicPr>
-            <a:picLocks noChangeAspect="1"/>
-          </p:cNvPicPr>
-          <p:nvPr/>
-        </p:nvPicPr>
-        <p:blipFill>
-          <a:blip r:embed="rId2"/>
-          <a:stretch>
-            <a:fillRect/>
-          </a:stretch>
-        </p:blipFill>
-        <p:spPr>
-          <a:xfrm>
-            <a:off x="4827011" y="2942617"/>
-            <a:ext cx="3994871" cy="3083069"/>
-          </a:xfrm>
-          <a:prstGeom prst="rect">
-            <a:avLst/>
-          </a:prstGeom>
-        </p:spPr>
-      </p:pic>
     </p:spTree>
     <p:extLst>
       <p:ext uri="{BB962C8B-B14F-4D97-AF65-F5344CB8AC3E}">
-        <p14:creationId xmlns:p14="http://schemas.microsoft.com/office/powerpoint/2010/main" val="1924996129"/>
-      </p:ext>
-    </p:extLst>
-  </p:cSld>
-  <p:clrMapOvr>
-    <a:masterClrMapping/>
-  </p:clrMapOvr>
-</p:sld>
-</file>
-
-<file path=ppt/slides/slide25.xml><?xml version="1.0" encoding="utf-8"?>
-<p:sld xmlns:a="http://schemas.openxmlformats.org/drawingml/2006/main" xmlns:r="http://schemas.openxmlformats.org/officeDocument/2006/relationships" xmlns:p="http://schemas.openxmlformats.org/presentationml/2006/main">
-  <p:cSld>
-    <p:spTree>
-      <p:nvGrpSpPr>
-        <p:cNvPr id="1" name=""/>
-        <p:cNvGrpSpPr/>
-        <p:nvPr/>
-      </p:nvGrpSpPr>
-      <p:grpSpPr>
-        <a:xfrm>
-          <a:off x="0" y="0"/>
-          <a:ext cx="0" cy="0"/>
-          <a:chOff x="0" y="0"/>
-          <a:chExt cx="0" cy="0"/>
-        </a:xfrm>
-      </p:grpSpPr>
-      <p:sp>
-        <p:nvSpPr>
-          <p:cNvPr id="2" name="Title 1">
-            <a:extLst>
-              <a:ext uri="{FF2B5EF4-FFF2-40B4-BE49-F238E27FC236}">
-                <a16:creationId xmlns:a16="http://schemas.microsoft.com/office/drawing/2014/main" id="{48ABF66F-16D1-4870-8C75-4C4582A25385}"/>
-              </a:ext>
-            </a:extLst>
-          </p:cNvPr>
-          <p:cNvSpPr>
-            <a:spLocks noGrp="1"/>
-          </p:cNvSpPr>
-          <p:nvPr>
-            <p:ph type="title"/>
-          </p:nvPr>
-        </p:nvSpPr>
-        <p:spPr/>
-        <p:txBody>
-          <a:bodyPr/>
-          <a:lstStyle/>
-          <a:p>
-            <a:pPr algn="ctr"/>
-            <a:r>
-              <a:rPr lang="en-US" dirty="0"/>
-              <a:t>Status Week of 10/26/21(4)</a:t>
-            </a:r>
-          </a:p>
-        </p:txBody>
-      </p:sp>
-      <p:sp>
-        <p:nvSpPr>
-          <p:cNvPr id="3" name="Content Placeholder 2">
-            <a:extLst>
-              <a:ext uri="{FF2B5EF4-FFF2-40B4-BE49-F238E27FC236}">
-                <a16:creationId xmlns:a16="http://schemas.microsoft.com/office/drawing/2014/main" id="{DB5B2A57-715A-4945-9C75-A9B28506B50B}"/>
-              </a:ext>
-            </a:extLst>
-          </p:cNvPr>
-          <p:cNvSpPr>
-            <a:spLocks noGrp="1"/>
-          </p:cNvSpPr>
-          <p:nvPr>
-            <p:ph idx="1"/>
-          </p:nvPr>
-        </p:nvSpPr>
-        <p:spPr/>
-        <p:txBody>
-          <a:bodyPr/>
-          <a:lstStyle/>
-          <a:p>
-            <a:pPr marL="0" indent="0">
-              <a:buNone/>
-            </a:pPr>
-            <a:endParaRPr lang="en-US" dirty="0"/>
-          </a:p>
-          <a:p>
-            <a:pPr marL="0" indent="0">
-              <a:buNone/>
-            </a:pPr>
-            <a:endParaRPr lang="en-US" dirty="0"/>
-          </a:p>
-          <a:p>
-            <a:endParaRPr lang="en-US" dirty="0"/>
-          </a:p>
-          <a:p>
-            <a:pPr marL="0" indent="0">
-              <a:buNone/>
-            </a:pPr>
-            <a:endParaRPr lang="en-US" dirty="0"/>
-          </a:p>
-          <a:p>
-            <a:pPr marL="0" indent="0">
-              <a:buNone/>
-            </a:pPr>
-            <a:endParaRPr lang="en-US" dirty="0"/>
-          </a:p>
-          <a:p>
-            <a:endParaRPr lang="en-US" dirty="0"/>
-          </a:p>
-          <a:p>
-            <a:endParaRPr lang="en-US" dirty="0"/>
-          </a:p>
-        </p:txBody>
-      </p:sp>
-      <p:pic>
-        <p:nvPicPr>
-          <p:cNvPr id="5" name="Picture 4">
-            <a:extLst>
-              <a:ext uri="{FF2B5EF4-FFF2-40B4-BE49-F238E27FC236}">
-                <a16:creationId xmlns:a16="http://schemas.microsoft.com/office/drawing/2014/main" id="{FD09D8EC-9011-42EF-9075-080AC0682FB7}"/>
-              </a:ext>
-            </a:extLst>
-          </p:cNvPr>
-          <p:cNvPicPr>
-            <a:picLocks noChangeAspect="1"/>
-          </p:cNvPicPr>
-          <p:nvPr/>
-        </p:nvPicPr>
-        <p:blipFill>
-          <a:blip r:embed="rId2"/>
-          <a:stretch>
-            <a:fillRect/>
-          </a:stretch>
-        </p:blipFill>
-        <p:spPr>
-          <a:xfrm>
-            <a:off x="838200" y="1987261"/>
-            <a:ext cx="3562305" cy="2761384"/>
-          </a:xfrm>
-          <a:prstGeom prst="rect">
-            <a:avLst/>
-          </a:prstGeom>
-        </p:spPr>
-      </p:pic>
-      <p:pic>
-        <p:nvPicPr>
-          <p:cNvPr id="8" name="Picture 7">
-            <a:extLst>
-              <a:ext uri="{FF2B5EF4-FFF2-40B4-BE49-F238E27FC236}">
-                <a16:creationId xmlns:a16="http://schemas.microsoft.com/office/drawing/2014/main" id="{DF005A00-800B-429C-AA85-50A49629391E}"/>
-              </a:ext>
-            </a:extLst>
-          </p:cNvPr>
-          <p:cNvPicPr>
-            <a:picLocks noChangeAspect="1"/>
-          </p:cNvPicPr>
-          <p:nvPr/>
-        </p:nvPicPr>
-        <p:blipFill>
-          <a:blip r:embed="rId3"/>
-          <a:stretch>
-            <a:fillRect/>
-          </a:stretch>
-        </p:blipFill>
-        <p:spPr>
-          <a:xfrm>
-            <a:off x="4486709" y="1979830"/>
-            <a:ext cx="3670156" cy="2810803"/>
-          </a:xfrm>
-          <a:prstGeom prst="rect">
-            <a:avLst/>
-          </a:prstGeom>
-        </p:spPr>
-      </p:pic>
-      <p:pic>
-        <p:nvPicPr>
-          <p:cNvPr id="10" name="Picture 9">
-            <a:extLst>
-              <a:ext uri="{FF2B5EF4-FFF2-40B4-BE49-F238E27FC236}">
-                <a16:creationId xmlns:a16="http://schemas.microsoft.com/office/drawing/2014/main" id="{14C6A524-1FE5-402A-8436-2B2BD12AD22A}"/>
-              </a:ext>
-            </a:extLst>
-          </p:cNvPr>
-          <p:cNvPicPr>
-            <a:picLocks noChangeAspect="1"/>
-          </p:cNvPicPr>
-          <p:nvPr/>
-        </p:nvPicPr>
-        <p:blipFill>
-          <a:blip r:embed="rId4"/>
-          <a:stretch>
-            <a:fillRect/>
-          </a:stretch>
-        </p:blipFill>
-        <p:spPr>
-          <a:xfrm>
-            <a:off x="8182025" y="1996560"/>
-            <a:ext cx="3623349" cy="2810804"/>
-          </a:xfrm>
-          <a:prstGeom prst="rect">
-            <a:avLst/>
-          </a:prstGeom>
-        </p:spPr>
-      </p:pic>
-    </p:spTree>
-    <p:extLst>
-      <p:ext uri="{BB962C8B-B14F-4D97-AF65-F5344CB8AC3E}">
-        <p14:creationId xmlns:p14="http://schemas.microsoft.com/office/powerpoint/2010/main" val="3150822350"/>
-      </p:ext>
-    </p:extLst>
-  </p:cSld>
-  <p:clrMapOvr>
-    <a:masterClrMapping/>
-  </p:clrMapOvr>
-</p:sld>
-</file>
-
-<file path=ppt/slides/slide26.xml><?xml version="1.0" encoding="utf-8"?>
-<p:sld xmlns:a="http://schemas.openxmlformats.org/drawingml/2006/main" xmlns:r="http://schemas.openxmlformats.org/officeDocument/2006/relationships" xmlns:p="http://schemas.openxmlformats.org/presentationml/2006/main">
-  <p:cSld>
-    <p:spTree>
-      <p:nvGrpSpPr>
-        <p:cNvPr id="1" name=""/>
-        <p:cNvGrpSpPr/>
-        <p:nvPr/>
-      </p:nvGrpSpPr>
-      <p:grpSpPr>
-        <a:xfrm>
-          <a:off x="0" y="0"/>
-          <a:ext cx="0" cy="0"/>
-          <a:chOff x="0" y="0"/>
-          <a:chExt cx="0" cy="0"/>
-        </a:xfrm>
-      </p:grpSpPr>
-      <p:sp>
-        <p:nvSpPr>
-          <p:cNvPr id="2" name="Title 1">
-            <a:extLst>
-              <a:ext uri="{FF2B5EF4-FFF2-40B4-BE49-F238E27FC236}">
-                <a16:creationId xmlns:a16="http://schemas.microsoft.com/office/drawing/2014/main" id="{48ABF66F-16D1-4870-8C75-4C4582A25385}"/>
-              </a:ext>
-            </a:extLst>
-          </p:cNvPr>
-          <p:cNvSpPr>
-            <a:spLocks noGrp="1"/>
-          </p:cNvSpPr>
-          <p:nvPr>
-            <p:ph type="title"/>
-          </p:nvPr>
-        </p:nvSpPr>
-        <p:spPr/>
-        <p:txBody>
-          <a:bodyPr/>
-          <a:lstStyle/>
-          <a:p>
-            <a:pPr algn="ctr"/>
-            <a:r>
-              <a:rPr lang="en-US" dirty="0"/>
-              <a:t>Status Week of 10/26/21(5)</a:t>
-            </a:r>
-          </a:p>
-        </p:txBody>
-      </p:sp>
-      <p:sp>
-        <p:nvSpPr>
-          <p:cNvPr id="3" name="Content Placeholder 2">
-            <a:extLst>
-              <a:ext uri="{FF2B5EF4-FFF2-40B4-BE49-F238E27FC236}">
-                <a16:creationId xmlns:a16="http://schemas.microsoft.com/office/drawing/2014/main" id="{DB5B2A57-715A-4945-9C75-A9B28506B50B}"/>
-              </a:ext>
-            </a:extLst>
-          </p:cNvPr>
-          <p:cNvSpPr>
-            <a:spLocks noGrp="1"/>
-          </p:cNvSpPr>
-          <p:nvPr>
-            <p:ph idx="1"/>
-          </p:nvPr>
-        </p:nvSpPr>
-        <p:spPr/>
-        <p:txBody>
-          <a:bodyPr/>
-          <a:lstStyle/>
-          <a:p>
-            <a:pPr marL="0" indent="0">
-              <a:buNone/>
-            </a:pPr>
-            <a:endParaRPr lang="en-US" dirty="0"/>
-          </a:p>
-          <a:p>
-            <a:pPr marL="0" indent="0">
-              <a:buNone/>
-            </a:pPr>
-            <a:endParaRPr lang="en-US" dirty="0"/>
-          </a:p>
-          <a:p>
-            <a:endParaRPr lang="en-US" dirty="0"/>
-          </a:p>
-          <a:p>
-            <a:pPr marL="0" indent="0">
-              <a:buNone/>
-            </a:pPr>
-            <a:endParaRPr lang="en-US" dirty="0"/>
-          </a:p>
-          <a:p>
-            <a:pPr marL="0" indent="0">
-              <a:buNone/>
-            </a:pPr>
-            <a:endParaRPr lang="en-US" dirty="0"/>
-          </a:p>
-          <a:p>
-            <a:endParaRPr lang="en-US" dirty="0"/>
-          </a:p>
-          <a:p>
-            <a:endParaRPr lang="en-US" dirty="0"/>
-          </a:p>
-        </p:txBody>
-      </p:sp>
-      <p:pic>
-        <p:nvPicPr>
-          <p:cNvPr id="6" name="Picture 5">
-            <a:extLst>
-              <a:ext uri="{FF2B5EF4-FFF2-40B4-BE49-F238E27FC236}">
-                <a16:creationId xmlns:a16="http://schemas.microsoft.com/office/drawing/2014/main" id="{C4E33607-14DD-411D-847B-7533977E4905}"/>
-              </a:ext>
-            </a:extLst>
-          </p:cNvPr>
-          <p:cNvPicPr>
-            <a:picLocks noChangeAspect="1"/>
-          </p:cNvPicPr>
-          <p:nvPr/>
-        </p:nvPicPr>
-        <p:blipFill>
-          <a:blip r:embed="rId2"/>
-          <a:stretch>
-            <a:fillRect/>
-          </a:stretch>
-        </p:blipFill>
-        <p:spPr>
-          <a:xfrm>
-            <a:off x="543073" y="2041144"/>
-            <a:ext cx="3670157" cy="2796599"/>
-          </a:xfrm>
-          <a:prstGeom prst="rect">
-            <a:avLst/>
-          </a:prstGeom>
-        </p:spPr>
-      </p:pic>
-      <p:pic>
-        <p:nvPicPr>
-          <p:cNvPr id="9" name="Picture 8">
-            <a:extLst>
-              <a:ext uri="{FF2B5EF4-FFF2-40B4-BE49-F238E27FC236}">
-                <a16:creationId xmlns:a16="http://schemas.microsoft.com/office/drawing/2014/main" id="{F10E1D18-3A60-44A0-AF6F-74EE502925A0}"/>
-              </a:ext>
-            </a:extLst>
-          </p:cNvPr>
-          <p:cNvPicPr>
-            <a:picLocks noChangeAspect="1"/>
-          </p:cNvPicPr>
-          <p:nvPr/>
-        </p:nvPicPr>
-        <p:blipFill>
-          <a:blip r:embed="rId3"/>
-          <a:stretch>
-            <a:fillRect/>
-          </a:stretch>
-        </p:blipFill>
-        <p:spPr>
-          <a:xfrm>
-            <a:off x="4213230" y="1996560"/>
-            <a:ext cx="3788561" cy="2890944"/>
-          </a:xfrm>
-          <a:prstGeom prst="rect">
-            <a:avLst/>
-          </a:prstGeom>
-        </p:spPr>
-      </p:pic>
-      <p:pic>
-        <p:nvPicPr>
-          <p:cNvPr id="12" name="Picture 11">
-            <a:extLst>
-              <a:ext uri="{FF2B5EF4-FFF2-40B4-BE49-F238E27FC236}">
-                <a16:creationId xmlns:a16="http://schemas.microsoft.com/office/drawing/2014/main" id="{C26F8D4E-3599-49E2-B411-8953833BC5A4}"/>
-              </a:ext>
-            </a:extLst>
-          </p:cNvPr>
-          <p:cNvPicPr>
-            <a:picLocks noChangeAspect="1"/>
-          </p:cNvPicPr>
-          <p:nvPr/>
-        </p:nvPicPr>
-        <p:blipFill>
-          <a:blip r:embed="rId4"/>
-          <a:stretch>
-            <a:fillRect/>
-          </a:stretch>
-        </p:blipFill>
-        <p:spPr>
-          <a:xfrm>
-            <a:off x="8001791" y="2041144"/>
-            <a:ext cx="3817290" cy="2890944"/>
-          </a:xfrm>
-          <a:prstGeom prst="rect">
-            <a:avLst/>
-          </a:prstGeom>
-        </p:spPr>
-      </p:pic>
-    </p:spTree>
-    <p:extLst>
-      <p:ext uri="{BB962C8B-B14F-4D97-AF65-F5344CB8AC3E}">
-        <p14:creationId xmlns:p14="http://schemas.microsoft.com/office/powerpoint/2010/main" val="1237183938"/>
+        <p14:creationId xmlns:p14="http://schemas.microsoft.com/office/powerpoint/2010/main" val="3240358057"/>
       </p:ext>
     </p:extLst>
   </p:cSld>
@@ -14667,8 +15373,59 @@
           <a:p>
             <a:r>
               <a:rPr lang="en-US" dirty="0"/>
-              <a:t>Difficult </a:t>
-            </a:r>
+              <a:t>Uniqueness of Patterns</a:t>
+            </a:r>
+          </a:p>
+          <a:p>
+            <a:r>
+              <a:rPr lang="en-US" dirty="0"/>
+              <a:t>Randomness from diffuser</a:t>
+            </a:r>
+          </a:p>
+          <a:p>
+            <a:pPr marL="0" indent="0">
+              <a:buNone/>
+            </a:pPr>
+            <a:r>
+              <a:rPr lang="en-US" dirty="0"/>
+              <a:t>   creates a type of spectral</a:t>
+            </a:r>
+          </a:p>
+          <a:p>
+            <a:pPr marL="0" indent="0">
+              <a:buNone/>
+            </a:pPr>
+            <a:r>
+              <a:rPr lang="en-US" dirty="0"/>
+              <a:t>   signature from every point </a:t>
+            </a:r>
+          </a:p>
+          <a:p>
+            <a:pPr marL="0" indent="0">
+              <a:buNone/>
+            </a:pPr>
+            <a:r>
+              <a:rPr lang="en-US" dirty="0"/>
+              <a:t>   source in our object</a:t>
+            </a:r>
+          </a:p>
+          <a:p>
+            <a:r>
+              <a:rPr lang="en-US" dirty="0"/>
+              <a:t> The depth acts as a scaling</a:t>
+            </a:r>
+          </a:p>
+          <a:p>
+            <a:pPr marL="0" indent="0">
+              <a:buNone/>
+            </a:pPr>
+            <a:r>
+              <a:rPr lang="en-US" dirty="0"/>
+              <a:t>    function while the lateral is a shift</a:t>
+            </a:r>
+          </a:p>
+          <a:p>
+            <a:endParaRPr lang="en-US" dirty="0"/>
           </a:p>
           <a:p>
             <a:pPr marL="0" indent="0">
@@ -14705,7 +15462,7 @@
           <p:nvPr/>
         </p:nvPicPr>
         <p:blipFill>
-          <a:blip r:embed="rId2"/>
+          <a:blip r:embed="rId3"/>
           <a:stretch>
             <a:fillRect/>
           </a:stretch>

</xml_diff>

<commit_message>
Added slides to presentation and a problem to homework #6.
</commit_message>
<xml_diff>
--- a/diffuser_cam_20211202_rev1.pptx
+++ b/diffuser_cam_20211202_rev1.pptx
@@ -222,7 +222,7 @@
           <a:p>
             <a:fld id="{98008065-9B79-4F39-8D1B-900E3912A032}" type="datetimeFigureOut">
               <a:rPr lang="en-US" smtClean="0"/>
-              <a:t>12/3/2021</a:t>
+              <a:t>12/5/2021</a:t>
             </a:fld>
             <a:endParaRPr lang="en-US"/>
           </a:p>
@@ -622,7 +622,15 @@
           <a:p>
             <a:r>
               <a:rPr lang="en-US" dirty="0"/>
-              <a:t>See diffuse; Raspberry Pi sensor, aperture, calibration.</a:t>
+              <a:t> In the equation b = </a:t>
+            </a:r>
+            <a:r>
+              <a:rPr lang="en-US" dirty="0" err="1"/>
+              <a:t>Hv</a:t>
+            </a:r>
+            <a:r>
+              <a:rPr lang="en-US" dirty="0"/>
+              <a:t>; H is the forward model whose columns consist of the caustic patterns</a:t>
             </a:r>
           </a:p>
         </p:txBody>
@@ -644,7 +652,7 @@
           <a:p>
             <a:fld id="{2E6E3671-7C21-40CE-930E-1BEAA135AFBB}" type="slidenum">
               <a:rPr lang="en-US" smtClean="0"/>
-              <a:t>15</a:t>
+              <a:t>13</a:t>
             </a:fld>
             <a:endParaRPr lang="en-US"/>
           </a:p>
@@ -653,7 +661,7 @@
     </p:spTree>
     <p:extLst>
       <p:ext uri="{BB962C8B-B14F-4D97-AF65-F5344CB8AC3E}">
-        <p14:creationId xmlns:p14="http://schemas.microsoft.com/office/powerpoint/2010/main" val="602056663"/>
+        <p14:creationId xmlns:p14="http://schemas.microsoft.com/office/powerpoint/2010/main" val="2090780147"/>
       </p:ext>
     </p:extLst>
   </p:cSld>
@@ -707,7 +715,10 @@
           <a:bodyPr/>
           <a:lstStyle/>
           <a:p>
-            <a:endParaRPr lang="en-US" dirty="0"/>
+            <a:r>
+              <a:rPr lang="en-US" dirty="0"/>
+              <a:t>See diffuse; Raspberry Pi sensor, aperture, calibration.</a:t>
+            </a:r>
           </a:p>
         </p:txBody>
       </p:sp>
@@ -728,7 +739,7 @@
           <a:p>
             <a:fld id="{2E6E3671-7C21-40CE-930E-1BEAA135AFBB}" type="slidenum">
               <a:rPr lang="en-US" smtClean="0"/>
-              <a:t>19</a:t>
+              <a:t>15</a:t>
             </a:fld>
             <a:endParaRPr lang="en-US"/>
           </a:p>
@@ -737,7 +748,7 @@
     </p:spTree>
     <p:extLst>
       <p:ext uri="{BB962C8B-B14F-4D97-AF65-F5344CB8AC3E}">
-        <p14:creationId xmlns:p14="http://schemas.microsoft.com/office/powerpoint/2010/main" val="3124275974"/>
+        <p14:creationId xmlns:p14="http://schemas.microsoft.com/office/powerpoint/2010/main" val="602056663"/>
       </p:ext>
     </p:extLst>
   </p:cSld>
@@ -791,10 +802,7 @@
           <a:bodyPr/>
           <a:lstStyle/>
           <a:p>
-            <a:r>
-              <a:rPr lang="en-US" dirty="0"/>
-              <a:t>Our voxel size again is our N dimension from earlier determines how fine a resolution we can see that ultimately is related to the complexity of the object and ultimately how much we can process.</a:t>
-            </a:r>
+            <a:endParaRPr lang="en-US" dirty="0"/>
           </a:p>
         </p:txBody>
       </p:sp>
@@ -815,7 +823,7 @@
           <a:p>
             <a:fld id="{2E6E3671-7C21-40CE-930E-1BEAA135AFBB}" type="slidenum">
               <a:rPr lang="en-US" smtClean="0"/>
-              <a:t>20</a:t>
+              <a:t>19</a:t>
             </a:fld>
             <a:endParaRPr lang="en-US"/>
           </a:p>
@@ -824,7 +832,7 @@
     </p:spTree>
     <p:extLst>
       <p:ext uri="{BB962C8B-B14F-4D97-AF65-F5344CB8AC3E}">
-        <p14:creationId xmlns:p14="http://schemas.microsoft.com/office/powerpoint/2010/main" val="1670217640"/>
+        <p14:creationId xmlns:p14="http://schemas.microsoft.com/office/powerpoint/2010/main" val="3124275974"/>
       </p:ext>
     </p:extLst>
   </p:cSld>
@@ -880,6 +888,93 @@
           <a:p>
             <a:r>
               <a:rPr lang="en-US" dirty="0"/>
+              <a:t>Our voxel size again is our N dimension from earlier determines how fine a resolution we can see that ultimately is related to the complexity of the object and ultimately how much we can process.</a:t>
+            </a:r>
+          </a:p>
+        </p:txBody>
+      </p:sp>
+      <p:sp>
+        <p:nvSpPr>
+          <p:cNvPr id="4" name="Slide Number Placeholder 3"/>
+          <p:cNvSpPr>
+            <a:spLocks noGrp="1"/>
+          </p:cNvSpPr>
+          <p:nvPr>
+            <p:ph type="sldNum" sz="quarter" idx="5"/>
+          </p:nvPr>
+        </p:nvSpPr>
+        <p:spPr/>
+        <p:txBody>
+          <a:bodyPr/>
+          <a:lstStyle/>
+          <a:p>
+            <a:fld id="{2E6E3671-7C21-40CE-930E-1BEAA135AFBB}" type="slidenum">
+              <a:rPr lang="en-US" smtClean="0"/>
+              <a:t>20</a:t>
+            </a:fld>
+            <a:endParaRPr lang="en-US"/>
+          </a:p>
+        </p:txBody>
+      </p:sp>
+    </p:spTree>
+    <p:extLst>
+      <p:ext uri="{BB962C8B-B14F-4D97-AF65-F5344CB8AC3E}">
+        <p14:creationId xmlns:p14="http://schemas.microsoft.com/office/powerpoint/2010/main" val="1670217640"/>
+      </p:ext>
+    </p:extLst>
+  </p:cSld>
+  <p:clrMapOvr>
+    <a:masterClrMapping/>
+  </p:clrMapOvr>
+</p:notes>
+</file>
+
+<file path=ppt/notesSlides/notesSlide14.xml><?xml version="1.0" encoding="utf-8"?>
+<p:notes xmlns:a="http://schemas.openxmlformats.org/drawingml/2006/main" xmlns:r="http://schemas.openxmlformats.org/officeDocument/2006/relationships" xmlns:p="http://schemas.openxmlformats.org/presentationml/2006/main">
+  <p:cSld>
+    <p:spTree>
+      <p:nvGrpSpPr>
+        <p:cNvPr id="1" name=""/>
+        <p:cNvGrpSpPr/>
+        <p:nvPr/>
+      </p:nvGrpSpPr>
+      <p:grpSpPr>
+        <a:xfrm>
+          <a:off x="0" y="0"/>
+          <a:ext cx="0" cy="0"/>
+          <a:chOff x="0" y="0"/>
+          <a:chExt cx="0" cy="0"/>
+        </a:xfrm>
+      </p:grpSpPr>
+      <p:sp>
+        <p:nvSpPr>
+          <p:cNvPr id="2" name="Slide Image Placeholder 1"/>
+          <p:cNvSpPr>
+            <a:spLocks noGrp="1" noRot="1" noChangeAspect="1"/>
+          </p:cNvSpPr>
+          <p:nvPr>
+            <p:ph type="sldImg"/>
+          </p:nvPr>
+        </p:nvSpPr>
+        <p:spPr/>
+      </p:sp>
+      <p:sp>
+        <p:nvSpPr>
+          <p:cNvPr id="3" name="Notes Placeholder 2"/>
+          <p:cNvSpPr>
+            <a:spLocks noGrp="1"/>
+          </p:cNvSpPr>
+          <p:nvPr>
+            <p:ph type="body" idx="1"/>
+          </p:nvPr>
+        </p:nvSpPr>
+        <p:spPr/>
+        <p:txBody>
+          <a:bodyPr/>
+          <a:lstStyle/>
+          <a:p>
+            <a:r>
+              <a:rPr lang="en-US" dirty="0"/>
               <a:t>However, this project has opened up some interesting lines of research to continue on.</a:t>
             </a:r>
           </a:p>
@@ -921,7 +1016,7 @@
 </p:notes>
 </file>
 
-<file path=ppt/notesSlides/notesSlide14.xml><?xml version="1.0" encoding="utf-8"?>
+<file path=ppt/notesSlides/notesSlide15.xml><?xml version="1.0" encoding="utf-8"?>
 <p:notes xmlns:a="http://schemas.openxmlformats.org/drawingml/2006/main" xmlns:r="http://schemas.openxmlformats.org/officeDocument/2006/relationships" xmlns:p="http://schemas.openxmlformats.org/presentationml/2006/main">
   <p:cSld>
     <p:spTree>
@@ -1160,23 +1255,15 @@
           <a:p>
             <a:r>
               <a:rPr lang="en-US" dirty="0"/>
-              <a:t> b = </a:t>
-            </a:r>
-            <a:r>
-              <a:rPr lang="en-US" dirty="0" err="1"/>
-              <a:t>Hv</a:t>
+              <a:t>In vivo microscopy and the 4</a:t>
+            </a:r>
+            <a:r>
+              <a:rPr lang="en-US" baseline="30000" dirty="0"/>
+              <a:t>th</a:t>
             </a:r>
             <a:r>
               <a:rPr lang="en-US" dirty="0"/>
-              <a:t> . You can think of this in our context as  b = 2D sensor array M So,  b (Mx1) = H(</a:t>
-            </a:r>
-            <a:r>
-              <a:rPr lang="en-US" dirty="0" err="1"/>
-              <a:t>MxN</a:t>
-            </a:r>
-            <a:r>
-              <a:rPr lang="en-US" dirty="0"/>
-              <a:t>)*V(Nx1); N is 3D voxels; M is 2D sensor array M &lt;&lt; N so this is an undetermined system. So, this can’t be solved by pre-2005 understanding of systems of equations, but if we enforce sparsity we do converge to a solution. This is a classical basis pursuit problem in compressive sensing. Also, the H array needs to have undistributed uncorrelated columns. </a:t>
+              <a:t> BME seminar.</a:t>
             </a:r>
           </a:p>
         </p:txBody>
@@ -1198,7 +1285,7 @@
           <a:p>
             <a:fld id="{2E6E3671-7C21-40CE-930E-1BEAA135AFBB}" type="slidenum">
               <a:rPr lang="en-US" smtClean="0"/>
-              <a:t>5</a:t>
+              <a:t>4</a:t>
             </a:fld>
             <a:endParaRPr lang="en-US"/>
           </a:p>
@@ -1207,7 +1294,7 @@
     </p:spTree>
     <p:extLst>
       <p:ext uri="{BB962C8B-B14F-4D97-AF65-F5344CB8AC3E}">
-        <p14:creationId xmlns:p14="http://schemas.microsoft.com/office/powerpoint/2010/main" val="2692531420"/>
+        <p14:creationId xmlns:p14="http://schemas.microsoft.com/office/powerpoint/2010/main" val="467355738"/>
       </p:ext>
     </p:extLst>
   </p:cSld>
@@ -1263,7 +1350,23 @@
           <a:p>
             <a:r>
               <a:rPr lang="en-US" dirty="0"/>
-              <a:t>Besides sparsity we need an extra bit of “magic” for our system matrix H. Let us look at the above</a:t>
+              <a:t> b = </a:t>
+            </a:r>
+            <a:r>
+              <a:rPr lang="en-US" dirty="0" err="1"/>
+              <a:t>Hv</a:t>
+            </a:r>
+            <a:r>
+              <a:rPr lang="en-US" dirty="0"/>
+              <a:t> . You can think of this in our context as  b = 2D sensor array M So,  b (Mx1) = H(</a:t>
+            </a:r>
+            <a:r>
+              <a:rPr lang="en-US" dirty="0" err="1"/>
+              <a:t>MxN</a:t>
+            </a:r>
+            <a:r>
+              <a:rPr lang="en-US" dirty="0"/>
+              <a:t>)*V(Nx1); N is 3D voxels; M is 2D sensor array M &lt;&lt; N so this is an undetermined system. So, this can’t be solved by pre-2005 understanding of systems of equations, but if we enforce sparsity we do converge to a solution. This is a classical basis pursuit problem in compressive sensing. Also, the H array needs to have undistributed uncorrelated columns. </a:t>
             </a:r>
           </a:p>
         </p:txBody>
@@ -1285,7 +1388,7 @@
           <a:p>
             <a:fld id="{2E6E3671-7C21-40CE-930E-1BEAA135AFBB}" type="slidenum">
               <a:rPr lang="en-US" smtClean="0"/>
-              <a:t>6</a:t>
+              <a:t>5</a:t>
             </a:fld>
             <a:endParaRPr lang="en-US"/>
           </a:p>
@@ -1294,7 +1397,7 @@
     </p:spTree>
     <p:extLst>
       <p:ext uri="{BB962C8B-B14F-4D97-AF65-F5344CB8AC3E}">
-        <p14:creationId xmlns:p14="http://schemas.microsoft.com/office/powerpoint/2010/main" val="45295255"/>
+        <p14:creationId xmlns:p14="http://schemas.microsoft.com/office/powerpoint/2010/main" val="2692531420"/>
       </p:ext>
     </p:extLst>
   </p:cSld>
@@ -1350,15 +1453,7 @@
           <a:p>
             <a:r>
               <a:rPr lang="en-US" dirty="0"/>
-              <a:t>So, now what do we have: 1. Satisfied sparsity. But sparsity is not enough, we also satisfied this uncertainty relation dual pair of basis that </a:t>
-            </a:r>
-            <a:r>
-              <a:rPr lang="en-US" dirty="0" err="1"/>
-              <a:t>satisifies</a:t>
-            </a:r>
-            <a:r>
-              <a:rPr lang="en-US" dirty="0"/>
-              <a:t> this uncorrelatedness. So, if we can just come up with a medium that allows this we are in business.</a:t>
+              <a:t>Besides sparsity we need an extra bit of “magic” for our system matrix H. Let us look at the above</a:t>
             </a:r>
           </a:p>
         </p:txBody>
@@ -1380,7 +1475,7 @@
           <a:p>
             <a:fld id="{2E6E3671-7C21-40CE-930E-1BEAA135AFBB}" type="slidenum">
               <a:rPr lang="en-US" smtClean="0"/>
-              <a:t>7</a:t>
+              <a:t>6</a:t>
             </a:fld>
             <a:endParaRPr lang="en-US"/>
           </a:p>
@@ -1389,7 +1484,7 @@
     </p:spTree>
     <p:extLst>
       <p:ext uri="{BB962C8B-B14F-4D97-AF65-F5344CB8AC3E}">
-        <p14:creationId xmlns:p14="http://schemas.microsoft.com/office/powerpoint/2010/main" val="1115974899"/>
+        <p14:creationId xmlns:p14="http://schemas.microsoft.com/office/powerpoint/2010/main" val="45295255"/>
       </p:ext>
     </p:extLst>
   </p:cSld>
@@ -1445,7 +1540,7 @@
           <a:p>
             <a:r>
               <a:rPr lang="en-US" dirty="0"/>
-              <a:t>Here is that medium.; A diffuser can be thought of as a kind of random matrix. So, all we would then need is for our voxels to be sparse in some domain. As we saw earlier in Professor Liang’s lecture on compressive imaging, we are saved as a random matrix multiplied by another matrix is still random. So, if we transpose our solution into a spare domain with some matrix we are still random.</a:t>
+              <a:t>So, now what do we have: 1. Satisfied sparsity. But sparsity is not enough, we also satisfied this uncertainty relation dual pair of basis that satisfies this uncorrelatedness. So, if we can just come up with a medium that allows this we are in business.</a:t>
             </a:r>
           </a:p>
         </p:txBody>
@@ -1467,7 +1562,7 @@
           <a:p>
             <a:fld id="{2E6E3671-7C21-40CE-930E-1BEAA135AFBB}" type="slidenum">
               <a:rPr lang="en-US" smtClean="0"/>
-              <a:t>8</a:t>
+              <a:t>7</a:t>
             </a:fld>
             <a:endParaRPr lang="en-US"/>
           </a:p>
@@ -1476,7 +1571,7 @@
     </p:spTree>
     <p:extLst>
       <p:ext uri="{BB962C8B-B14F-4D97-AF65-F5344CB8AC3E}">
-        <p14:creationId xmlns:p14="http://schemas.microsoft.com/office/powerpoint/2010/main" val="3359120609"/>
+        <p14:creationId xmlns:p14="http://schemas.microsoft.com/office/powerpoint/2010/main" val="1115974899"/>
       </p:ext>
     </p:extLst>
   </p:cSld>
@@ -1532,15 +1627,7 @@
           <a:p>
             <a:r>
               <a:rPr lang="en-US" dirty="0"/>
-              <a:t>And if you remember from linear systems, a shift is just a re-</a:t>
-            </a:r>
-            <a:r>
-              <a:rPr lang="en-US" dirty="0" err="1"/>
-              <a:t>cyle</a:t>
-            </a:r>
-            <a:r>
-              <a:rPr lang="en-US" dirty="0"/>
-              <a:t> of data in the convolution matrix</a:t>
+              <a:t>Here is that medium.; A diffuser can be thought of as a kind of random matrix. So, all we would then need is for our voxels to be sparse in some domain. As we saw earlier in Professor Liang’s lecture on compressive imaging, we are saved as a random matrix multiplied by another matrix is still random. So, if we transpose our solution into a spare domain with some matrix we are still random.</a:t>
             </a:r>
           </a:p>
         </p:txBody>
@@ -1562,7 +1649,7 @@
           <a:p>
             <a:fld id="{2E6E3671-7C21-40CE-930E-1BEAA135AFBB}" type="slidenum">
               <a:rPr lang="en-US" smtClean="0"/>
-              <a:t>9</a:t>
+              <a:t>8</a:t>
             </a:fld>
             <a:endParaRPr lang="en-US"/>
           </a:p>
@@ -1571,7 +1658,7 @@
     </p:spTree>
     <p:extLst>
       <p:ext uri="{BB962C8B-B14F-4D97-AF65-F5344CB8AC3E}">
-        <p14:creationId xmlns:p14="http://schemas.microsoft.com/office/powerpoint/2010/main" val="2210293565"/>
+        <p14:creationId xmlns:p14="http://schemas.microsoft.com/office/powerpoint/2010/main" val="3359120609"/>
       </p:ext>
     </p:extLst>
   </p:cSld>
@@ -1627,25 +1714,15 @@
           <a:p>
             <a:r>
               <a:rPr lang="en-US" dirty="0"/>
-              <a:t>Here we would like to have something faster to compute for 3-D imaging. We use the FISTA in our experiments. The ADMM is a popular optimization these days. Basically, if you have a way of separating the problem into two convex functions, and you can then make your constraints linearly then there is a big speedup. This method is related to a penalty of </a:t>
+              <a:t>And if you remember from linear systems, a shift is just a re-</a:t>
             </a:r>
             <a:r>
               <a:rPr lang="en-US" dirty="0" err="1"/>
-              <a:t>Lagrangian</a:t>
+              <a:t>cyle</a:t>
             </a:r>
             <a:r>
               <a:rPr lang="en-US" dirty="0"/>
-              <a:t> methods. I am not very familiar with ADMM but am familiar with </a:t>
-            </a:r>
-          </a:p>
-          <a:p>
-            <a:r>
-              <a:rPr lang="en-US" dirty="0" err="1"/>
-              <a:t>Lagrangian</a:t>
-            </a:r>
-            <a:r>
-              <a:rPr lang="en-US" dirty="0"/>
-              <a:t> methods that speed up optimization. I have used such techniques in doing video compression, where the idea is to reduce bit rate but maintain distortion.. This is the classical bitrate  distortion problem in information theory.</a:t>
+              <a:t> of data in the convolution matrix</a:t>
             </a:r>
           </a:p>
         </p:txBody>
@@ -1667,7 +1744,7 @@
           <a:p>
             <a:fld id="{2E6E3671-7C21-40CE-930E-1BEAA135AFBB}" type="slidenum">
               <a:rPr lang="en-US" smtClean="0"/>
-              <a:t>12</a:t>
+              <a:t>9</a:t>
             </a:fld>
             <a:endParaRPr lang="en-US"/>
           </a:p>
@@ -1676,7 +1753,7 @@
     </p:spTree>
     <p:extLst>
       <p:ext uri="{BB962C8B-B14F-4D97-AF65-F5344CB8AC3E}">
-        <p14:creationId xmlns:p14="http://schemas.microsoft.com/office/powerpoint/2010/main" val="3621225657"/>
+        <p14:creationId xmlns:p14="http://schemas.microsoft.com/office/powerpoint/2010/main" val="2210293565"/>
       </p:ext>
     </p:extLst>
   </p:cSld>
@@ -1732,15 +1809,25 @@
           <a:p>
             <a:r>
               <a:rPr lang="en-US" dirty="0"/>
-              <a:t> In the equation b = </a:t>
+              <a:t>Here we would like to have something faster to compute for 3-D imaging. We use the FISTA in our experiments. The ADMM is a popular optimization these days. Basically, if you have a way of separating the problem into two convex functions, and you can then make your constraints linearly then there is a big speedup. This method is related to a penalty of </a:t>
             </a:r>
             <a:r>
               <a:rPr lang="en-US" dirty="0" err="1"/>
-              <a:t>Hv</a:t>
+              <a:t>Lagrangian</a:t>
             </a:r>
             <a:r>
               <a:rPr lang="en-US" dirty="0"/>
-              <a:t>; H is the forward model whose columns consist of the caustic patterns</a:t>
+              <a:t> methods. I am not very familiar with ADMM but am familiar with </a:t>
+            </a:r>
+          </a:p>
+          <a:p>
+            <a:r>
+              <a:rPr lang="en-US" dirty="0" err="1"/>
+              <a:t>Lagrangian</a:t>
+            </a:r>
+            <a:r>
+              <a:rPr lang="en-US" dirty="0"/>
+              <a:t> methods that speed up optimization. I have used such techniques in doing video compression, where the idea is to reduce bit rate but maintain distortion.. This is the classical bitrate  distortion problem in information theory.</a:t>
             </a:r>
           </a:p>
         </p:txBody>
@@ -1762,7 +1849,7 @@
           <a:p>
             <a:fld id="{2E6E3671-7C21-40CE-930E-1BEAA135AFBB}" type="slidenum">
               <a:rPr lang="en-US" smtClean="0"/>
-              <a:t>13</a:t>
+              <a:t>12</a:t>
             </a:fld>
             <a:endParaRPr lang="en-US"/>
           </a:p>
@@ -1771,7 +1858,7 @@
     </p:spTree>
     <p:extLst>
       <p:ext uri="{BB962C8B-B14F-4D97-AF65-F5344CB8AC3E}">
-        <p14:creationId xmlns:p14="http://schemas.microsoft.com/office/powerpoint/2010/main" val="2090780147"/>
+        <p14:creationId xmlns:p14="http://schemas.microsoft.com/office/powerpoint/2010/main" val="3621225657"/>
       </p:ext>
     </p:extLst>
   </p:cSld>
@@ -1928,7 +2015,7 @@
           <a:p>
             <a:fld id="{F118C18E-C054-41D8-913A-83E1640DCC71}" type="datetimeFigureOut">
               <a:rPr lang="en-US" smtClean="0"/>
-              <a:t>12/3/2021</a:t>
+              <a:t>12/5/2021</a:t>
             </a:fld>
             <a:endParaRPr lang="en-US"/>
           </a:p>
@@ -2163,7 +2250,7 @@
           <a:p>
             <a:fld id="{F118C18E-C054-41D8-913A-83E1640DCC71}" type="datetimeFigureOut">
               <a:rPr lang="en-US" smtClean="0"/>
-              <a:t>12/3/2021</a:t>
+              <a:t>12/5/2021</a:t>
             </a:fld>
             <a:endParaRPr lang="en-US"/>
           </a:p>
@@ -2371,7 +2458,7 @@
           <a:p>
             <a:fld id="{F118C18E-C054-41D8-913A-83E1640DCC71}" type="datetimeFigureOut">
               <a:rPr lang="en-US" smtClean="0"/>
-              <a:t>12/3/2021</a:t>
+              <a:t>12/5/2021</a:t>
             </a:fld>
             <a:endParaRPr lang="en-US"/>
           </a:p>
@@ -2591,7 +2678,7 @@
           <a:p>
             <a:fld id="{E9BE3FA0-2B14-423A-9FE1-EC24057C347C}" type="datetimeFigureOut">
               <a:rPr lang="en-US" smtClean="0"/>
-              <a:t>12/3/2021</a:t>
+              <a:t>12/5/2021</a:t>
             </a:fld>
             <a:endParaRPr lang="en-US"/>
           </a:p>
@@ -2789,7 +2876,7 @@
           <a:p>
             <a:fld id="{E9BE3FA0-2B14-423A-9FE1-EC24057C347C}" type="datetimeFigureOut">
               <a:rPr lang="en-US" smtClean="0"/>
-              <a:t>12/3/2021</a:t>
+              <a:t>12/5/2021</a:t>
             </a:fld>
             <a:endParaRPr lang="en-US"/>
           </a:p>
@@ -3064,7 +3151,7 @@
           <a:p>
             <a:fld id="{E9BE3FA0-2B14-423A-9FE1-EC24057C347C}" type="datetimeFigureOut">
               <a:rPr lang="en-US" smtClean="0"/>
-              <a:t>12/3/2021</a:t>
+              <a:t>12/5/2021</a:t>
             </a:fld>
             <a:endParaRPr lang="en-US"/>
           </a:p>
@@ -3329,7 +3416,7 @@
           <a:p>
             <a:fld id="{E9BE3FA0-2B14-423A-9FE1-EC24057C347C}" type="datetimeFigureOut">
               <a:rPr lang="en-US" smtClean="0"/>
-              <a:t>12/3/2021</a:t>
+              <a:t>12/5/2021</a:t>
             </a:fld>
             <a:endParaRPr lang="en-US"/>
           </a:p>
@@ -3741,7 +3828,7 @@
           <a:p>
             <a:fld id="{E9BE3FA0-2B14-423A-9FE1-EC24057C347C}" type="datetimeFigureOut">
               <a:rPr lang="en-US" smtClean="0"/>
-              <a:t>12/3/2021</a:t>
+              <a:t>12/5/2021</a:t>
             </a:fld>
             <a:endParaRPr lang="en-US"/>
           </a:p>
@@ -3882,7 +3969,7 @@
           <a:p>
             <a:fld id="{E9BE3FA0-2B14-423A-9FE1-EC24057C347C}" type="datetimeFigureOut">
               <a:rPr lang="en-US" smtClean="0"/>
-              <a:t>12/3/2021</a:t>
+              <a:t>12/5/2021</a:t>
             </a:fld>
             <a:endParaRPr lang="en-US"/>
           </a:p>
@@ -3995,7 +4082,7 @@
           <a:p>
             <a:fld id="{E9BE3FA0-2B14-423A-9FE1-EC24057C347C}" type="datetimeFigureOut">
               <a:rPr lang="en-US" smtClean="0"/>
-              <a:t>12/3/2021</a:t>
+              <a:t>12/5/2021</a:t>
             </a:fld>
             <a:endParaRPr lang="en-US"/>
           </a:p>
@@ -4306,7 +4393,7 @@
           <a:p>
             <a:fld id="{E9BE3FA0-2B14-423A-9FE1-EC24057C347C}" type="datetimeFigureOut">
               <a:rPr lang="en-US" smtClean="0"/>
-              <a:t>12/3/2021</a:t>
+              <a:t>12/5/2021</a:t>
             </a:fld>
             <a:endParaRPr lang="en-US"/>
           </a:p>
@@ -4518,7 +4605,7 @@
           <a:p>
             <a:fld id="{F118C18E-C054-41D8-913A-83E1640DCC71}" type="datetimeFigureOut">
               <a:rPr lang="en-US" smtClean="0"/>
-              <a:t>12/3/2021</a:t>
+              <a:t>12/5/2021</a:t>
             </a:fld>
             <a:endParaRPr lang="en-US"/>
           </a:p>
@@ -4847,7 +4934,7 @@
           <a:p>
             <a:fld id="{E9BE3FA0-2B14-423A-9FE1-EC24057C347C}" type="datetimeFigureOut">
               <a:rPr lang="en-US" smtClean="0"/>
-              <a:t>12/3/2021</a:t>
+              <a:t>12/5/2021</a:t>
             </a:fld>
             <a:endParaRPr lang="en-US"/>
           </a:p>
@@ -5045,7 +5132,7 @@
           <a:p>
             <a:fld id="{E9BE3FA0-2B14-423A-9FE1-EC24057C347C}" type="datetimeFigureOut">
               <a:rPr lang="en-US" smtClean="0"/>
-              <a:t>12/3/2021</a:t>
+              <a:t>12/5/2021</a:t>
             </a:fld>
             <a:endParaRPr lang="en-US"/>
           </a:p>
@@ -5253,7 +5340,7 @@
           <a:p>
             <a:fld id="{E9BE3FA0-2B14-423A-9FE1-EC24057C347C}" type="datetimeFigureOut">
               <a:rPr lang="en-US" smtClean="0"/>
-              <a:t>12/3/2021</a:t>
+              <a:t>12/5/2021</a:t>
             </a:fld>
             <a:endParaRPr lang="en-US"/>
           </a:p>
@@ -5473,7 +5560,7 @@
           <a:p>
             <a:fld id="{E0FC1750-9FAC-4B43-8F8F-A30FF6CE9CF0}" type="datetimeFigureOut">
               <a:rPr lang="en-US" smtClean="0"/>
-              <a:t>12/3/2021</a:t>
+              <a:t>12/5/2021</a:t>
             </a:fld>
             <a:endParaRPr lang="en-US"/>
           </a:p>
@@ -5671,7 +5758,7 @@
           <a:p>
             <a:fld id="{E0FC1750-9FAC-4B43-8F8F-A30FF6CE9CF0}" type="datetimeFigureOut">
               <a:rPr lang="en-US" smtClean="0"/>
-              <a:t>12/3/2021</a:t>
+              <a:t>12/5/2021</a:t>
             </a:fld>
             <a:endParaRPr lang="en-US"/>
           </a:p>
@@ -5946,7 +6033,7 @@
           <a:p>
             <a:fld id="{E0FC1750-9FAC-4B43-8F8F-A30FF6CE9CF0}" type="datetimeFigureOut">
               <a:rPr lang="en-US" smtClean="0"/>
-              <a:t>12/3/2021</a:t>
+              <a:t>12/5/2021</a:t>
             </a:fld>
             <a:endParaRPr lang="en-US"/>
           </a:p>
@@ -6211,7 +6298,7 @@
           <a:p>
             <a:fld id="{E0FC1750-9FAC-4B43-8F8F-A30FF6CE9CF0}" type="datetimeFigureOut">
               <a:rPr lang="en-US" smtClean="0"/>
-              <a:t>12/3/2021</a:t>
+              <a:t>12/5/2021</a:t>
             </a:fld>
             <a:endParaRPr lang="en-US"/>
           </a:p>
@@ -6623,7 +6710,7 @@
           <a:p>
             <a:fld id="{E0FC1750-9FAC-4B43-8F8F-A30FF6CE9CF0}" type="datetimeFigureOut">
               <a:rPr lang="en-US" smtClean="0"/>
-              <a:t>12/3/2021</a:t>
+              <a:t>12/5/2021</a:t>
             </a:fld>
             <a:endParaRPr lang="en-US"/>
           </a:p>
@@ -6764,7 +6851,7 @@
           <a:p>
             <a:fld id="{E0FC1750-9FAC-4B43-8F8F-A30FF6CE9CF0}" type="datetimeFigureOut">
               <a:rPr lang="en-US" smtClean="0"/>
-              <a:t>12/3/2021</a:t>
+              <a:t>12/5/2021</a:t>
             </a:fld>
             <a:endParaRPr lang="en-US"/>
           </a:p>
@@ -6877,7 +6964,7 @@
           <a:p>
             <a:fld id="{E0FC1750-9FAC-4B43-8F8F-A30FF6CE9CF0}" type="datetimeFigureOut">
               <a:rPr lang="en-US" smtClean="0"/>
-              <a:t>12/3/2021</a:t>
+              <a:t>12/5/2021</a:t>
             </a:fld>
             <a:endParaRPr lang="en-US"/>
           </a:p>
@@ -7152,7 +7239,7 @@
           <a:p>
             <a:fld id="{F118C18E-C054-41D8-913A-83E1640DCC71}" type="datetimeFigureOut">
               <a:rPr lang="en-US" smtClean="0"/>
-              <a:t>12/3/2021</a:t>
+              <a:t>12/5/2021</a:t>
             </a:fld>
             <a:endParaRPr lang="en-US"/>
           </a:p>
@@ -7463,7 +7550,7 @@
           <a:p>
             <a:fld id="{E0FC1750-9FAC-4B43-8F8F-A30FF6CE9CF0}" type="datetimeFigureOut">
               <a:rPr lang="en-US" smtClean="0"/>
-              <a:t>12/3/2021</a:t>
+              <a:t>12/5/2021</a:t>
             </a:fld>
             <a:endParaRPr lang="en-US"/>
           </a:p>
@@ -7751,7 +7838,7 @@
           <a:p>
             <a:fld id="{E0FC1750-9FAC-4B43-8F8F-A30FF6CE9CF0}" type="datetimeFigureOut">
               <a:rPr lang="en-US" smtClean="0"/>
-              <a:t>12/3/2021</a:t>
+              <a:t>12/5/2021</a:t>
             </a:fld>
             <a:endParaRPr lang="en-US"/>
           </a:p>
@@ -7949,7 +8036,7 @@
           <a:p>
             <a:fld id="{E0FC1750-9FAC-4B43-8F8F-A30FF6CE9CF0}" type="datetimeFigureOut">
               <a:rPr lang="en-US" smtClean="0"/>
-              <a:t>12/3/2021</a:t>
+              <a:t>12/5/2021</a:t>
             </a:fld>
             <a:endParaRPr lang="en-US"/>
           </a:p>
@@ -8157,7 +8244,7 @@
           <a:p>
             <a:fld id="{E0FC1750-9FAC-4B43-8F8F-A30FF6CE9CF0}" type="datetimeFigureOut">
               <a:rPr lang="en-US" smtClean="0"/>
-              <a:t>12/3/2021</a:t>
+              <a:t>12/5/2021</a:t>
             </a:fld>
             <a:endParaRPr lang="en-US"/>
           </a:p>
@@ -8422,7 +8509,7 @@
           <a:p>
             <a:fld id="{F118C18E-C054-41D8-913A-83E1640DCC71}" type="datetimeFigureOut">
               <a:rPr lang="en-US" smtClean="0"/>
-              <a:t>12/3/2021</a:t>
+              <a:t>12/5/2021</a:t>
             </a:fld>
             <a:endParaRPr lang="en-US"/>
           </a:p>
@@ -8834,7 +8921,7 @@
           <a:p>
             <a:fld id="{F118C18E-C054-41D8-913A-83E1640DCC71}" type="datetimeFigureOut">
               <a:rPr lang="en-US" smtClean="0"/>
-              <a:t>12/3/2021</a:t>
+              <a:t>12/5/2021</a:t>
             </a:fld>
             <a:endParaRPr lang="en-US"/>
           </a:p>
@@ -8975,7 +9062,7 @@
           <a:p>
             <a:fld id="{F118C18E-C054-41D8-913A-83E1640DCC71}" type="datetimeFigureOut">
               <a:rPr lang="en-US" smtClean="0"/>
-              <a:t>12/3/2021</a:t>
+              <a:t>12/5/2021</a:t>
             </a:fld>
             <a:endParaRPr lang="en-US"/>
           </a:p>
@@ -9088,7 +9175,7 @@
           <a:p>
             <a:fld id="{F118C18E-C054-41D8-913A-83E1640DCC71}" type="datetimeFigureOut">
               <a:rPr lang="en-US" smtClean="0"/>
-              <a:t>12/3/2021</a:t>
+              <a:t>12/5/2021</a:t>
             </a:fld>
             <a:endParaRPr lang="en-US"/>
           </a:p>
@@ -9399,7 +9486,7 @@
           <a:p>
             <a:fld id="{F118C18E-C054-41D8-913A-83E1640DCC71}" type="datetimeFigureOut">
               <a:rPr lang="en-US" smtClean="0"/>
-              <a:t>12/3/2021</a:t>
+              <a:t>12/5/2021</a:t>
             </a:fld>
             <a:endParaRPr lang="en-US"/>
           </a:p>
@@ -9687,7 +9774,7 @@
           <a:p>
             <a:fld id="{F118C18E-C054-41D8-913A-83E1640DCC71}" type="datetimeFigureOut">
               <a:rPr lang="en-US" smtClean="0"/>
-              <a:t>12/3/2021</a:t>
+              <a:t>12/5/2021</a:t>
             </a:fld>
             <a:endParaRPr lang="en-US"/>
           </a:p>
@@ -9928,7 +10015,7 @@
           <a:p>
             <a:fld id="{F118C18E-C054-41D8-913A-83E1640DCC71}" type="datetimeFigureOut">
               <a:rPr lang="en-US" smtClean="0"/>
-              <a:t>12/3/2021</a:t>
+              <a:t>12/5/2021</a:t>
             </a:fld>
             <a:endParaRPr lang="en-US"/>
           </a:p>
@@ -10496,7 +10583,7 @@
           <a:p>
             <a:fld id="{E9BE3FA0-2B14-423A-9FE1-EC24057C347C}" type="datetimeFigureOut">
               <a:rPr lang="en-US" smtClean="0"/>
-              <a:t>12/3/2021</a:t>
+              <a:t>12/5/2021</a:t>
             </a:fld>
             <a:endParaRPr lang="en-US"/>
           </a:p>
@@ -11064,7 +11151,7 @@
           <a:p>
             <a:fld id="{E0FC1750-9FAC-4B43-8F8F-A30FF6CE9CF0}" type="datetimeFigureOut">
               <a:rPr lang="en-US" smtClean="0"/>
-              <a:t>12/3/2021</a:t>
+              <a:t>12/5/2021</a:t>
             </a:fld>
             <a:endParaRPr lang="en-US"/>
           </a:p>
@@ -12417,9 +12504,52 @@
           </a:p>
           <a:p>
             <a:r>
+              <a:rPr lang="en-US" dirty="0" err="1"/>
+              <a:t>Antipa</a:t>
+            </a:r>
+            <a:r>
               <a:rPr lang="en-US" dirty="0"/>
-              <a:t>Difficult </a:t>
-            </a:r>
+              <a:t> builds a forward convolutional model</a:t>
+            </a:r>
+          </a:p>
+          <a:p>
+            <a:r>
+              <a:rPr lang="en-US" dirty="0"/>
+              <a:t>Incorporates a cropped convolution</a:t>
+            </a:r>
+          </a:p>
+          <a:p>
+            <a:pPr lvl="1"/>
+            <a:r>
+              <a:rPr lang="en-US" dirty="0"/>
+              <a:t>Trick of not using H directly</a:t>
+            </a:r>
+          </a:p>
+          <a:p>
+            <a:pPr lvl="1"/>
+            <a:r>
+              <a:rPr lang="en-US" dirty="0"/>
+              <a:t>Confirms random matrix</a:t>
+            </a:r>
+          </a:p>
+          <a:p>
+            <a:pPr marL="457200" lvl="1" indent="0">
+              <a:buNone/>
+            </a:pPr>
+            <a:r>
+              <a:rPr lang="en-US" dirty="0"/>
+              <a:t>    and  use of compressed sensing</a:t>
+            </a:r>
+          </a:p>
+          <a:p>
+            <a:pPr lvl="1"/>
+            <a:r>
+              <a:rPr lang="en-US" dirty="0"/>
+              <a:t>In Theory allows a simple calibration</a:t>
+            </a:r>
+          </a:p>
+          <a:p>
+            <a:endParaRPr lang="en-US" dirty="0"/>
           </a:p>
           <a:p>
             <a:pPr marL="0" indent="0">
@@ -12463,7 +12593,7 @@
         </p:blipFill>
         <p:spPr>
           <a:xfrm>
-            <a:off x="6267657" y="2949229"/>
+            <a:off x="7821154" y="2772248"/>
             <a:ext cx="3095625" cy="2847975"/>
           </a:xfrm>
           <a:prstGeom prst="rect">
@@ -14529,7 +14659,49 @@
           <a:p>
             <a:r>
               <a:rPr lang="en-US" dirty="0"/>
-              <a:t>Difficult </a:t>
+              <a:t>Problem:  Provide a light-field representation of 4-D information( plenoptic(2 coordinates and 2 angles)  into 2-D sensor</a:t>
+            </a:r>
+          </a:p>
+          <a:p>
+            <a:r>
+              <a:rPr lang="en-US" dirty="0"/>
+              <a:t>We want system to be inexpensive, flexible and compact</a:t>
+            </a:r>
+          </a:p>
+          <a:p>
+            <a:r>
+              <a:rPr lang="en-US" dirty="0"/>
+              <a:t>Previous work:</a:t>
+            </a:r>
+          </a:p>
+          <a:p>
+            <a:pPr lvl="1"/>
+            <a:r>
+              <a:rPr lang="en-US" dirty="0"/>
+              <a:t>Coded aperture light field… limits amount of light</a:t>
+            </a:r>
+          </a:p>
+          <a:p>
+            <a:pPr lvl="1"/>
+            <a:r>
+              <a:rPr lang="en-US" dirty="0" err="1"/>
+              <a:t>Microlens</a:t>
+            </a:r>
+            <a:r>
+              <a:rPr lang="en-US" dirty="0"/>
+              <a:t>….. Does not scale well</a:t>
+            </a:r>
+          </a:p>
+          <a:p>
+            <a:r>
+              <a:rPr lang="en-US" dirty="0"/>
+              <a:t>Address Field of View vs Resolution imaging</a:t>
+            </a:r>
+          </a:p>
+          <a:p>
+            <a:r>
+              <a:rPr lang="en-US" dirty="0"/>
+              <a:t>Further develop state of art for scatter models</a:t>
             </a:r>
           </a:p>
           <a:p>
@@ -14640,7 +14812,37 @@
           <a:p>
             <a:r>
               <a:rPr lang="en-US" dirty="0"/>
-              <a:t>Difficult </a:t>
+              <a:t>In Vivo microscopy and neurological imaging</a:t>
+            </a:r>
+          </a:p>
+          <a:p>
+            <a:pPr lvl="1"/>
+            <a:r>
+              <a:rPr lang="en-US" dirty="0"/>
+              <a:t>The problem of scattering in biological tissue is a challenging open topic today in microscopy.</a:t>
+            </a:r>
+          </a:p>
+          <a:p>
+            <a:pPr lvl="1"/>
+            <a:r>
+              <a:rPr lang="en-US" dirty="0"/>
+              <a:t>How to solve depth problem vs resolution</a:t>
+            </a:r>
+          </a:p>
+          <a:p>
+            <a:pPr lvl="1"/>
+            <a:r>
+              <a:rPr lang="en-US" dirty="0"/>
+              <a:t>As an example confocal( low depth and high resolution) vs MRI with high depth but low resolution.</a:t>
+            </a:r>
+          </a:p>
+          <a:p>
+            <a:pPr marL="0" indent="0">
+              <a:buNone/>
+            </a:pPr>
+            <a:r>
+              <a:rPr lang="en-US" dirty="0"/>
+              <a:t> </a:t>
             </a:r>
           </a:p>
           <a:p>
@@ -15232,7 +15434,7 @@
           <a:p>
             <a:r>
               <a:rPr lang="en-US" dirty="0"/>
-              <a:t>Difficult </a:t>
+              <a:t>Can be thought of as random matrix</a:t>
             </a:r>
           </a:p>
           <a:p>
@@ -15248,9 +15450,18 @@
             <a:endParaRPr lang="en-US" dirty="0"/>
           </a:p>
           <a:p>
+            <a:pPr marL="0" indent="0">
+              <a:buNone/>
+            </a:pPr>
             <a:endParaRPr lang="en-US" dirty="0"/>
           </a:p>
           <a:p>
+            <a:endParaRPr lang="en-US" dirty="0"/>
+          </a:p>
+          <a:p>
+            <a:pPr marL="0" indent="0">
+              <a:buNone/>
+            </a:pPr>
             <a:endParaRPr lang="en-US" dirty="0"/>
           </a:p>
         </p:txBody>

</xml_diff>

<commit_message>
Added another revision of the presentation.
</commit_message>
<xml_diff>
--- a/diffuser_cam_20211202_rev1.pptx
+++ b/diffuser_cam_20211202_rev1.pptx
@@ -222,7 +222,7 @@
           <a:p>
             <a:fld id="{98008065-9B79-4F39-8D1B-900E3912A032}" type="datetimeFigureOut">
               <a:rPr lang="en-US" smtClean="0"/>
-              <a:t>12/5/2021</a:t>
+              <a:t>12/7/2021</a:t>
             </a:fld>
             <a:endParaRPr lang="en-US"/>
           </a:p>
@@ -2015,7 +2015,7 @@
           <a:p>
             <a:fld id="{F118C18E-C054-41D8-913A-83E1640DCC71}" type="datetimeFigureOut">
               <a:rPr lang="en-US" smtClean="0"/>
-              <a:t>12/5/2021</a:t>
+              <a:t>12/7/2021</a:t>
             </a:fld>
             <a:endParaRPr lang="en-US"/>
           </a:p>
@@ -2250,7 +2250,7 @@
           <a:p>
             <a:fld id="{F118C18E-C054-41D8-913A-83E1640DCC71}" type="datetimeFigureOut">
               <a:rPr lang="en-US" smtClean="0"/>
-              <a:t>12/5/2021</a:t>
+              <a:t>12/7/2021</a:t>
             </a:fld>
             <a:endParaRPr lang="en-US"/>
           </a:p>
@@ -2458,7 +2458,7 @@
           <a:p>
             <a:fld id="{F118C18E-C054-41D8-913A-83E1640DCC71}" type="datetimeFigureOut">
               <a:rPr lang="en-US" smtClean="0"/>
-              <a:t>12/5/2021</a:t>
+              <a:t>12/7/2021</a:t>
             </a:fld>
             <a:endParaRPr lang="en-US"/>
           </a:p>
@@ -2678,7 +2678,7 @@
           <a:p>
             <a:fld id="{E9BE3FA0-2B14-423A-9FE1-EC24057C347C}" type="datetimeFigureOut">
               <a:rPr lang="en-US" smtClean="0"/>
-              <a:t>12/5/2021</a:t>
+              <a:t>12/7/2021</a:t>
             </a:fld>
             <a:endParaRPr lang="en-US"/>
           </a:p>
@@ -2876,7 +2876,7 @@
           <a:p>
             <a:fld id="{E9BE3FA0-2B14-423A-9FE1-EC24057C347C}" type="datetimeFigureOut">
               <a:rPr lang="en-US" smtClean="0"/>
-              <a:t>12/5/2021</a:t>
+              <a:t>12/7/2021</a:t>
             </a:fld>
             <a:endParaRPr lang="en-US"/>
           </a:p>
@@ -3151,7 +3151,7 @@
           <a:p>
             <a:fld id="{E9BE3FA0-2B14-423A-9FE1-EC24057C347C}" type="datetimeFigureOut">
               <a:rPr lang="en-US" smtClean="0"/>
-              <a:t>12/5/2021</a:t>
+              <a:t>12/7/2021</a:t>
             </a:fld>
             <a:endParaRPr lang="en-US"/>
           </a:p>
@@ -3416,7 +3416,7 @@
           <a:p>
             <a:fld id="{E9BE3FA0-2B14-423A-9FE1-EC24057C347C}" type="datetimeFigureOut">
               <a:rPr lang="en-US" smtClean="0"/>
-              <a:t>12/5/2021</a:t>
+              <a:t>12/7/2021</a:t>
             </a:fld>
             <a:endParaRPr lang="en-US"/>
           </a:p>
@@ -3828,7 +3828,7 @@
           <a:p>
             <a:fld id="{E9BE3FA0-2B14-423A-9FE1-EC24057C347C}" type="datetimeFigureOut">
               <a:rPr lang="en-US" smtClean="0"/>
-              <a:t>12/5/2021</a:t>
+              <a:t>12/7/2021</a:t>
             </a:fld>
             <a:endParaRPr lang="en-US"/>
           </a:p>
@@ -3969,7 +3969,7 @@
           <a:p>
             <a:fld id="{E9BE3FA0-2B14-423A-9FE1-EC24057C347C}" type="datetimeFigureOut">
               <a:rPr lang="en-US" smtClean="0"/>
-              <a:t>12/5/2021</a:t>
+              <a:t>12/7/2021</a:t>
             </a:fld>
             <a:endParaRPr lang="en-US"/>
           </a:p>
@@ -4082,7 +4082,7 @@
           <a:p>
             <a:fld id="{E9BE3FA0-2B14-423A-9FE1-EC24057C347C}" type="datetimeFigureOut">
               <a:rPr lang="en-US" smtClean="0"/>
-              <a:t>12/5/2021</a:t>
+              <a:t>12/7/2021</a:t>
             </a:fld>
             <a:endParaRPr lang="en-US"/>
           </a:p>
@@ -4393,7 +4393,7 @@
           <a:p>
             <a:fld id="{E9BE3FA0-2B14-423A-9FE1-EC24057C347C}" type="datetimeFigureOut">
               <a:rPr lang="en-US" smtClean="0"/>
-              <a:t>12/5/2021</a:t>
+              <a:t>12/7/2021</a:t>
             </a:fld>
             <a:endParaRPr lang="en-US"/>
           </a:p>
@@ -4605,7 +4605,7 @@
           <a:p>
             <a:fld id="{F118C18E-C054-41D8-913A-83E1640DCC71}" type="datetimeFigureOut">
               <a:rPr lang="en-US" smtClean="0"/>
-              <a:t>12/5/2021</a:t>
+              <a:t>12/7/2021</a:t>
             </a:fld>
             <a:endParaRPr lang="en-US"/>
           </a:p>
@@ -4934,7 +4934,7 @@
           <a:p>
             <a:fld id="{E9BE3FA0-2B14-423A-9FE1-EC24057C347C}" type="datetimeFigureOut">
               <a:rPr lang="en-US" smtClean="0"/>
-              <a:t>12/5/2021</a:t>
+              <a:t>12/7/2021</a:t>
             </a:fld>
             <a:endParaRPr lang="en-US"/>
           </a:p>
@@ -5132,7 +5132,7 @@
           <a:p>
             <a:fld id="{E9BE3FA0-2B14-423A-9FE1-EC24057C347C}" type="datetimeFigureOut">
               <a:rPr lang="en-US" smtClean="0"/>
-              <a:t>12/5/2021</a:t>
+              <a:t>12/7/2021</a:t>
             </a:fld>
             <a:endParaRPr lang="en-US"/>
           </a:p>
@@ -5340,7 +5340,7 @@
           <a:p>
             <a:fld id="{E9BE3FA0-2B14-423A-9FE1-EC24057C347C}" type="datetimeFigureOut">
               <a:rPr lang="en-US" smtClean="0"/>
-              <a:t>12/5/2021</a:t>
+              <a:t>12/7/2021</a:t>
             </a:fld>
             <a:endParaRPr lang="en-US"/>
           </a:p>
@@ -5560,7 +5560,7 @@
           <a:p>
             <a:fld id="{E0FC1750-9FAC-4B43-8F8F-A30FF6CE9CF0}" type="datetimeFigureOut">
               <a:rPr lang="en-US" smtClean="0"/>
-              <a:t>12/5/2021</a:t>
+              <a:t>12/7/2021</a:t>
             </a:fld>
             <a:endParaRPr lang="en-US"/>
           </a:p>
@@ -5758,7 +5758,7 @@
           <a:p>
             <a:fld id="{E0FC1750-9FAC-4B43-8F8F-A30FF6CE9CF0}" type="datetimeFigureOut">
               <a:rPr lang="en-US" smtClean="0"/>
-              <a:t>12/5/2021</a:t>
+              <a:t>12/7/2021</a:t>
             </a:fld>
             <a:endParaRPr lang="en-US"/>
           </a:p>
@@ -6033,7 +6033,7 @@
           <a:p>
             <a:fld id="{E0FC1750-9FAC-4B43-8F8F-A30FF6CE9CF0}" type="datetimeFigureOut">
               <a:rPr lang="en-US" smtClean="0"/>
-              <a:t>12/5/2021</a:t>
+              <a:t>12/7/2021</a:t>
             </a:fld>
             <a:endParaRPr lang="en-US"/>
           </a:p>
@@ -6298,7 +6298,7 @@
           <a:p>
             <a:fld id="{E0FC1750-9FAC-4B43-8F8F-A30FF6CE9CF0}" type="datetimeFigureOut">
               <a:rPr lang="en-US" smtClean="0"/>
-              <a:t>12/5/2021</a:t>
+              <a:t>12/7/2021</a:t>
             </a:fld>
             <a:endParaRPr lang="en-US"/>
           </a:p>
@@ -6710,7 +6710,7 @@
           <a:p>
             <a:fld id="{E0FC1750-9FAC-4B43-8F8F-A30FF6CE9CF0}" type="datetimeFigureOut">
               <a:rPr lang="en-US" smtClean="0"/>
-              <a:t>12/5/2021</a:t>
+              <a:t>12/7/2021</a:t>
             </a:fld>
             <a:endParaRPr lang="en-US"/>
           </a:p>
@@ -6851,7 +6851,7 @@
           <a:p>
             <a:fld id="{E0FC1750-9FAC-4B43-8F8F-A30FF6CE9CF0}" type="datetimeFigureOut">
               <a:rPr lang="en-US" smtClean="0"/>
-              <a:t>12/5/2021</a:t>
+              <a:t>12/7/2021</a:t>
             </a:fld>
             <a:endParaRPr lang="en-US"/>
           </a:p>
@@ -6964,7 +6964,7 @@
           <a:p>
             <a:fld id="{E0FC1750-9FAC-4B43-8F8F-A30FF6CE9CF0}" type="datetimeFigureOut">
               <a:rPr lang="en-US" smtClean="0"/>
-              <a:t>12/5/2021</a:t>
+              <a:t>12/7/2021</a:t>
             </a:fld>
             <a:endParaRPr lang="en-US"/>
           </a:p>
@@ -7239,7 +7239,7 @@
           <a:p>
             <a:fld id="{F118C18E-C054-41D8-913A-83E1640DCC71}" type="datetimeFigureOut">
               <a:rPr lang="en-US" smtClean="0"/>
-              <a:t>12/5/2021</a:t>
+              <a:t>12/7/2021</a:t>
             </a:fld>
             <a:endParaRPr lang="en-US"/>
           </a:p>
@@ -7550,7 +7550,7 @@
           <a:p>
             <a:fld id="{E0FC1750-9FAC-4B43-8F8F-A30FF6CE9CF0}" type="datetimeFigureOut">
               <a:rPr lang="en-US" smtClean="0"/>
-              <a:t>12/5/2021</a:t>
+              <a:t>12/7/2021</a:t>
             </a:fld>
             <a:endParaRPr lang="en-US"/>
           </a:p>
@@ -7838,7 +7838,7 @@
           <a:p>
             <a:fld id="{E0FC1750-9FAC-4B43-8F8F-A30FF6CE9CF0}" type="datetimeFigureOut">
               <a:rPr lang="en-US" smtClean="0"/>
-              <a:t>12/5/2021</a:t>
+              <a:t>12/7/2021</a:t>
             </a:fld>
             <a:endParaRPr lang="en-US"/>
           </a:p>
@@ -8036,7 +8036,7 @@
           <a:p>
             <a:fld id="{E0FC1750-9FAC-4B43-8F8F-A30FF6CE9CF0}" type="datetimeFigureOut">
               <a:rPr lang="en-US" smtClean="0"/>
-              <a:t>12/5/2021</a:t>
+              <a:t>12/7/2021</a:t>
             </a:fld>
             <a:endParaRPr lang="en-US"/>
           </a:p>
@@ -8244,7 +8244,7 @@
           <a:p>
             <a:fld id="{E0FC1750-9FAC-4B43-8F8F-A30FF6CE9CF0}" type="datetimeFigureOut">
               <a:rPr lang="en-US" smtClean="0"/>
-              <a:t>12/5/2021</a:t>
+              <a:t>12/7/2021</a:t>
             </a:fld>
             <a:endParaRPr lang="en-US"/>
           </a:p>
@@ -8509,7 +8509,7 @@
           <a:p>
             <a:fld id="{F118C18E-C054-41D8-913A-83E1640DCC71}" type="datetimeFigureOut">
               <a:rPr lang="en-US" smtClean="0"/>
-              <a:t>12/5/2021</a:t>
+              <a:t>12/7/2021</a:t>
             </a:fld>
             <a:endParaRPr lang="en-US"/>
           </a:p>
@@ -8921,7 +8921,7 @@
           <a:p>
             <a:fld id="{F118C18E-C054-41D8-913A-83E1640DCC71}" type="datetimeFigureOut">
               <a:rPr lang="en-US" smtClean="0"/>
-              <a:t>12/5/2021</a:t>
+              <a:t>12/7/2021</a:t>
             </a:fld>
             <a:endParaRPr lang="en-US"/>
           </a:p>
@@ -9062,7 +9062,7 @@
           <a:p>
             <a:fld id="{F118C18E-C054-41D8-913A-83E1640DCC71}" type="datetimeFigureOut">
               <a:rPr lang="en-US" smtClean="0"/>
-              <a:t>12/5/2021</a:t>
+              <a:t>12/7/2021</a:t>
             </a:fld>
             <a:endParaRPr lang="en-US"/>
           </a:p>
@@ -9175,7 +9175,7 @@
           <a:p>
             <a:fld id="{F118C18E-C054-41D8-913A-83E1640DCC71}" type="datetimeFigureOut">
               <a:rPr lang="en-US" smtClean="0"/>
-              <a:t>12/5/2021</a:t>
+              <a:t>12/7/2021</a:t>
             </a:fld>
             <a:endParaRPr lang="en-US"/>
           </a:p>
@@ -9486,7 +9486,7 @@
           <a:p>
             <a:fld id="{F118C18E-C054-41D8-913A-83E1640DCC71}" type="datetimeFigureOut">
               <a:rPr lang="en-US" smtClean="0"/>
-              <a:t>12/5/2021</a:t>
+              <a:t>12/7/2021</a:t>
             </a:fld>
             <a:endParaRPr lang="en-US"/>
           </a:p>
@@ -9774,7 +9774,7 @@
           <a:p>
             <a:fld id="{F118C18E-C054-41D8-913A-83E1640DCC71}" type="datetimeFigureOut">
               <a:rPr lang="en-US" smtClean="0"/>
-              <a:t>12/5/2021</a:t>
+              <a:t>12/7/2021</a:t>
             </a:fld>
             <a:endParaRPr lang="en-US"/>
           </a:p>
@@ -10015,7 +10015,7 @@
           <a:p>
             <a:fld id="{F118C18E-C054-41D8-913A-83E1640DCC71}" type="datetimeFigureOut">
               <a:rPr lang="en-US" smtClean="0"/>
-              <a:t>12/5/2021</a:t>
+              <a:t>12/7/2021</a:t>
             </a:fld>
             <a:endParaRPr lang="en-US"/>
           </a:p>
@@ -10583,7 +10583,7 @@
           <a:p>
             <a:fld id="{E9BE3FA0-2B14-423A-9FE1-EC24057C347C}" type="datetimeFigureOut">
               <a:rPr lang="en-US" smtClean="0"/>
-              <a:t>12/5/2021</a:t>
+              <a:t>12/7/2021</a:t>
             </a:fld>
             <a:endParaRPr lang="en-US"/>
           </a:p>
@@ -11151,7 +11151,7 @@
           <a:p>
             <a:fld id="{E0FC1750-9FAC-4B43-8F8F-A30FF6CE9CF0}" type="datetimeFigureOut">
               <a:rPr lang="en-US" smtClean="0"/>
-              <a:t>12/5/2021</a:t>
+              <a:t>12/7/2021</a:t>
             </a:fld>
             <a:endParaRPr lang="en-US"/>
           </a:p>
@@ -13479,9 +13479,10 @@
           <a:p>
             <a:pPr algn="ctr"/>
             <a:r>
-              <a:rPr lang="en-US" dirty="0"/>
-              <a:t>Topics</a:t>
-            </a:r>
+              <a:rPr lang="en-US"/>
+              <a:t>Agenda</a:t>
+            </a:r>
+            <a:endParaRPr lang="en-US" dirty="0"/>
           </a:p>
         </p:txBody>
       </p:sp>

</xml_diff>